<commit_message>
Szenario angefügt, sieht jetzt aber wahrscheinlich kacke aus!
</commit_message>
<xml_diff>
--- a/Präsi_Requirements-RebeccaTest.pptx
+++ b/Präsi_Requirements-RebeccaTest.pptx
@@ -15,6 +15,8 @@
     <p:sldId id="262" r:id="rId10"/>
     <p:sldId id="263" r:id="rId11"/>
     <p:sldId id="264" r:id="rId12"/>
+    <p:sldId id="265" r:id="rId13"/>
+    <p:sldId id="266" r:id="rId14"/>
   </p:sldIdLst>
   <p:sldSz cx="12192000" cy="6858000"/>
   <p:notesSz cx="7559675" cy="10691812"/>
@@ -3146,7 +3148,7 @@
                 <a:spcPct val="100000"/>
               </a:lnSpc>
             </a:pPr>
-            <a:fld id="{1E53A8B3-80DE-48E1-9A90-99E793C02138}" type="slidenum">
+            <a:fld id="{58832314-B7C5-444C-A7ED-F1BD433F605C}" type="slidenum">
               <a:rPr b="0" lang="de-DE" sz="1200" spc="-1" strike="noStrike">
                 <a:solidFill>
                   <a:srgbClr val="8b8b8b"/>
@@ -3158,7 +3160,7 @@
                 </a:uFill>
                 <a:latin typeface="Calibri"/>
               </a:rPr>
-              <a:t>9</a:t>
+              <a:t>&lt;Foliennummer&gt;</a:t>
             </a:fld>
             <a:endParaRPr b="0" lang="de-DE" sz="1400" spc="-1" strike="noStrike">
               <a:solidFill>
@@ -4077,7 +4079,7 @@
                 <a:spcPct val="100000"/>
               </a:lnSpc>
             </a:pPr>
-            <a:fld id="{6239DD1F-D00A-48F3-8718-EBB4C9F0BCF3}" type="slidenum">
+            <a:fld id="{0031E326-3E02-46D2-85F8-1D8985614492}" type="slidenum">
               <a:rPr b="0" lang="de-DE" sz="1200" spc="-1" strike="noStrike">
                 <a:solidFill>
                   <a:srgbClr val="8b8b8b"/>
@@ -4089,7 +4091,7 @@
                 </a:uFill>
                 <a:latin typeface="Calibri"/>
               </a:rPr>
-              <a:t>&lt;Foliennummer&gt;</a:t>
+              <a:t>1</a:t>
             </a:fld>
             <a:endParaRPr b="0" lang="de-DE" sz="1400" spc="-1" strike="noStrike">
               <a:solidFill>
@@ -4320,6 +4322,1670 @@
           <p:childTnLst>
             <p:seq>
               <p:cTn id="2" nodeType="mainSeq"/>
+              <p:prevCondLst>
+                <p:cond delay="0" evt="onPrev">
+                  <p:tgtEl>
+                    <p:sldTgt/>
+                  </p:tgtEl>
+                </p:cond>
+              </p:prevCondLst>
+              <p:nextCondLst>
+                <p:cond delay="0" evt="onNext">
+                  <p:tgtEl>
+                    <p:sldTgt/>
+                  </p:tgtEl>
+                </p:cond>
+              </p:nextCondLst>
+            </p:seq>
+          </p:childTnLst>
+        </p:cTn>
+      </p:par>
+    </p:tnLst>
+  </p:timing>
+</p:sld>
+</file>
+
+<file path=ppt/slides/slide10.xml><?xml version="1.0" encoding="utf-8"?>
+<p:sld xmlns:a="http://schemas.openxmlformats.org/drawingml/2006/main" xmlns:p="http://schemas.openxmlformats.org/presentationml/2006/main" xmlns:r="http://schemas.openxmlformats.org/officeDocument/2006/relationships" xmlns:p14="http://schemas.microsoft.com/office/powerpoint/2010/main" xmlns:p15="http://schemas.microsoft.com/office/powerpoint/2012/main" xmlns:mc="http://schemas.openxmlformats.org/markup-compatibility/2006">
+  <p:cSld>
+    <p:spTree>
+      <p:nvGrpSpPr>
+        <p:cNvPr id="1" name=""/>
+        <p:cNvGrpSpPr/>
+        <p:nvPr/>
+      </p:nvGrpSpPr>
+      <p:grpSpPr>
+        <a:xfrm>
+          <a:off x="0" y="0"/>
+          <a:ext cx="0" cy="0"/>
+          <a:chOff x="0" y="0"/>
+          <a:chExt cx="0" cy="0"/>
+        </a:xfrm>
+      </p:grpSpPr>
+      <p:sp>
+        <p:nvSpPr>
+          <p:cNvPr id="96" name="TextShape 1"/>
+          <p:cNvSpPr txBox="1"/>
+          <p:nvPr/>
+        </p:nvSpPr>
+        <p:spPr>
+          <a:xfrm>
+            <a:off x="838080" y="365040"/>
+            <a:ext cx="10515240" cy="1325160"/>
+          </a:xfrm>
+          <a:prstGeom prst="rect">
+            <a:avLst/>
+          </a:prstGeom>
+          <a:noFill/>
+          <a:ln>
+            <a:noFill/>
+          </a:ln>
+        </p:spPr>
+        <p:txBody>
+          <a:bodyPr lIns="0" rIns="0" tIns="0" bIns="0" anchor="ctr"/>
+          <a:p>
+            <a:pPr algn="ctr"/>
+            <a:r>
+              <a:rPr b="0" lang="de-DE" sz="4400" spc="-1" strike="noStrike">
+                <a:solidFill>
+                  <a:srgbClr val="000000"/>
+                </a:solidFill>
+                <a:uFill>
+                  <a:solidFill>
+                    <a:srgbClr val="ffffff"/>
+                  </a:solidFill>
+                </a:uFill>
+                <a:latin typeface="Calibri"/>
+              </a:rPr>
+              <a:t>Registrierung – was alles schief gehen kann</a:t>
+            </a:r>
+            <a:endParaRPr b="0" lang="de-DE" sz="4400" spc="-1" strike="noStrike">
+              <a:solidFill>
+                <a:srgbClr val="000000"/>
+              </a:solidFill>
+              <a:uFill>
+                <a:solidFill>
+                  <a:srgbClr val="ffffff"/>
+                </a:solidFill>
+              </a:uFill>
+              <a:latin typeface="Calibri"/>
+            </a:endParaRPr>
+          </a:p>
+        </p:txBody>
+      </p:sp>
+      <p:sp>
+        <p:nvSpPr>
+          <p:cNvPr id="97" name="TextShape 2"/>
+          <p:cNvSpPr txBox="1"/>
+          <p:nvPr/>
+        </p:nvSpPr>
+        <p:spPr>
+          <a:xfrm>
+            <a:off x="838080" y="1825560"/>
+            <a:ext cx="5131080" cy="4350960"/>
+          </a:xfrm>
+          <a:prstGeom prst="rect">
+            <a:avLst/>
+          </a:prstGeom>
+          <a:noFill/>
+          <a:ln>
+            <a:noFill/>
+          </a:ln>
+        </p:spPr>
+        <p:txBody>
+          <a:bodyPr lIns="0" rIns="0" tIns="0" bIns="0"/>
+          <a:p>
+            <a:pPr marL="432000" indent="-324000">
+              <a:buClr>
+                <a:srgbClr val="000000"/>
+              </a:buClr>
+              <a:buSzPct val="45000"/>
+              <a:buFont typeface="Wingdings" charset="2"/>
+              <a:buChar char=""/>
+            </a:pPr>
+            <a:r>
+              <a:rPr b="0" lang="de-DE" sz="2800" spc="-1" strike="noStrike">
+                <a:solidFill>
+                  <a:srgbClr val="000000"/>
+                </a:solidFill>
+                <a:uFill>
+                  <a:solidFill>
+                    <a:srgbClr val="ffffff"/>
+                  </a:solidFill>
+                </a:uFill>
+                <a:latin typeface="Calibri"/>
+              </a:rPr>
+              <a:t> </a:t>
+            </a:r>
+            <a:r>
+              <a:rPr b="0" lang="de-DE" sz="2800" spc="-1" strike="noStrike">
+                <a:solidFill>
+                  <a:srgbClr val="000000"/>
+                </a:solidFill>
+                <a:uFill>
+                  <a:solidFill>
+                    <a:srgbClr val="ffffff"/>
+                  </a:solidFill>
+                </a:uFill>
+                <a:latin typeface="Calibri"/>
+              </a:rPr>
+              <a:t>Die App ist für das verwendete OS </a:t>
+            </a:r>
+            <a:r>
+              <a:rPr b="1" lang="de-DE" sz="2800" spc="-1" strike="noStrike">
+                <a:solidFill>
+                  <a:srgbClr val="000000"/>
+                </a:solidFill>
+                <a:uFill>
+                  <a:solidFill>
+                    <a:srgbClr val="ffffff"/>
+                  </a:solidFill>
+                </a:uFill>
+                <a:latin typeface="Calibri"/>
+              </a:rPr>
+              <a:t>nicht verfügbar</a:t>
+            </a:r>
+            <a:r>
+              <a:rPr b="0" lang="de-DE" sz="2800" spc="-1" strike="noStrike">
+                <a:solidFill>
+                  <a:srgbClr val="000000"/>
+                </a:solidFill>
+                <a:uFill>
+                  <a:solidFill>
+                    <a:srgbClr val="ffffff"/>
+                  </a:solidFill>
+                </a:uFill>
+                <a:latin typeface="Calibri"/>
+              </a:rPr>
+              <a:t>.</a:t>
+            </a:r>
+            <a:endParaRPr b="0" lang="de-DE" sz="2800" spc="-1" strike="noStrike">
+              <a:solidFill>
+                <a:srgbClr val="000000"/>
+              </a:solidFill>
+              <a:uFill>
+                <a:solidFill>
+                  <a:srgbClr val="ffffff"/>
+                </a:solidFill>
+              </a:uFill>
+              <a:latin typeface="Calibri"/>
+            </a:endParaRPr>
+          </a:p>
+          <a:p>
+            <a:pPr marL="432000" indent="-324000">
+              <a:buClr>
+                <a:srgbClr val="000000"/>
+              </a:buClr>
+              <a:buSzPct val="45000"/>
+              <a:buFont typeface="Wingdings" charset="2"/>
+              <a:buChar char=""/>
+            </a:pPr>
+            <a:r>
+              <a:rPr b="0" lang="de-DE" sz="2800" spc="-1" strike="noStrike">
+                <a:solidFill>
+                  <a:srgbClr val="000000"/>
+                </a:solidFill>
+                <a:uFill>
+                  <a:solidFill>
+                    <a:srgbClr val="ffffff"/>
+                  </a:solidFill>
+                </a:uFill>
+                <a:latin typeface="Calibri"/>
+              </a:rPr>
+              <a:t> </a:t>
+            </a:r>
+            <a:r>
+              <a:rPr b="0" lang="de-DE" sz="2800" spc="-1" strike="noStrike">
+                <a:solidFill>
+                  <a:srgbClr val="000000"/>
+                </a:solidFill>
+                <a:uFill>
+                  <a:solidFill>
+                    <a:srgbClr val="ffffff"/>
+                  </a:solidFill>
+                </a:uFill>
+                <a:latin typeface="Calibri"/>
+              </a:rPr>
+              <a:t>Die App ist zwar verfügbar, </a:t>
+            </a:r>
+            <a:r>
+              <a:rPr b="1" lang="de-DE" sz="2800" spc="-1" strike="noStrike">
+                <a:solidFill>
+                  <a:srgbClr val="000000"/>
+                </a:solidFill>
+                <a:uFill>
+                  <a:solidFill>
+                    <a:srgbClr val="ffffff"/>
+                  </a:solidFill>
+                </a:uFill>
+                <a:latin typeface="Calibri"/>
+              </a:rPr>
+              <a:t>läuft</a:t>
+            </a:r>
+            <a:r>
+              <a:rPr b="0" lang="de-DE" sz="2800" spc="-1" strike="noStrike">
+                <a:solidFill>
+                  <a:srgbClr val="000000"/>
+                </a:solidFill>
+                <a:uFill>
+                  <a:solidFill>
+                    <a:srgbClr val="ffffff"/>
+                  </a:solidFill>
+                </a:uFill>
+                <a:latin typeface="Calibri"/>
+              </a:rPr>
+              <a:t> aber auf dem verwendeten System </a:t>
+            </a:r>
+            <a:r>
+              <a:rPr b="1" lang="de-DE" sz="2800" spc="-1" strike="noStrike">
+                <a:solidFill>
+                  <a:srgbClr val="000000"/>
+                </a:solidFill>
+                <a:uFill>
+                  <a:solidFill>
+                    <a:srgbClr val="ffffff"/>
+                  </a:solidFill>
+                </a:uFill>
+                <a:latin typeface="Calibri"/>
+              </a:rPr>
+              <a:t>nicht</a:t>
+            </a:r>
+            <a:r>
+              <a:rPr b="0" lang="de-DE" sz="2800" spc="-1" strike="noStrike">
+                <a:solidFill>
+                  <a:srgbClr val="000000"/>
+                </a:solidFill>
+                <a:uFill>
+                  <a:solidFill>
+                    <a:srgbClr val="ffffff"/>
+                  </a:solidFill>
+                </a:uFill>
+                <a:latin typeface="Calibri"/>
+              </a:rPr>
+              <a:t>.</a:t>
+            </a:r>
+            <a:endParaRPr b="0" lang="de-DE" sz="2800" spc="-1" strike="noStrike">
+              <a:solidFill>
+                <a:srgbClr val="000000"/>
+              </a:solidFill>
+              <a:uFill>
+                <a:solidFill>
+                  <a:srgbClr val="ffffff"/>
+                </a:solidFill>
+              </a:uFill>
+              <a:latin typeface="Calibri"/>
+            </a:endParaRPr>
+          </a:p>
+          <a:p>
+            <a:pPr marL="432000" indent="-324000">
+              <a:buClr>
+                <a:srgbClr val="000000"/>
+              </a:buClr>
+              <a:buSzPct val="45000"/>
+              <a:buFont typeface="Wingdings" charset="2"/>
+              <a:buChar char=""/>
+            </a:pPr>
+            <a:r>
+              <a:rPr b="0" lang="de-DE" sz="2800" spc="-1" strike="noStrike">
+                <a:solidFill>
+                  <a:srgbClr val="000000"/>
+                </a:solidFill>
+                <a:uFill>
+                  <a:solidFill>
+                    <a:srgbClr val="ffffff"/>
+                  </a:solidFill>
+                </a:uFill>
+                <a:latin typeface="Calibri"/>
+              </a:rPr>
+              <a:t> </a:t>
+            </a:r>
+            <a:r>
+              <a:rPr b="0" lang="de-DE" sz="2800" spc="-1" strike="noStrike">
+                <a:solidFill>
+                  <a:srgbClr val="000000"/>
+                </a:solidFill>
+                <a:uFill>
+                  <a:solidFill>
+                    <a:srgbClr val="ffffff"/>
+                  </a:solidFill>
+                </a:uFill>
+                <a:latin typeface="Calibri"/>
+              </a:rPr>
+              <a:t>Die App läuft </a:t>
+            </a:r>
+            <a:r>
+              <a:rPr b="1" lang="de-DE" sz="2800" spc="-1" strike="noStrike">
+                <a:solidFill>
+                  <a:srgbClr val="000000"/>
+                </a:solidFill>
+                <a:uFill>
+                  <a:solidFill>
+                    <a:srgbClr val="ffffff"/>
+                  </a:solidFill>
+                </a:uFill>
+                <a:latin typeface="Calibri"/>
+              </a:rPr>
+              <a:t>unbrauchbar langsam</a:t>
+            </a:r>
+            <a:r>
+              <a:rPr b="0" lang="de-DE" sz="2800" spc="-1" strike="noStrike">
+                <a:solidFill>
+                  <a:srgbClr val="000000"/>
+                </a:solidFill>
+                <a:uFill>
+                  <a:solidFill>
+                    <a:srgbClr val="ffffff"/>
+                  </a:solidFill>
+                </a:uFill>
+                <a:latin typeface="Calibri"/>
+              </a:rPr>
+              <a:t>.</a:t>
+            </a:r>
+            <a:endParaRPr b="0" lang="de-DE" sz="2800" spc="-1" strike="noStrike">
+              <a:solidFill>
+                <a:srgbClr val="000000"/>
+              </a:solidFill>
+              <a:uFill>
+                <a:solidFill>
+                  <a:srgbClr val="ffffff"/>
+                </a:solidFill>
+              </a:uFill>
+              <a:latin typeface="Calibri"/>
+            </a:endParaRPr>
+          </a:p>
+          <a:p>
+            <a:pPr marL="432000" indent="-324000">
+              <a:buClr>
+                <a:srgbClr val="000000"/>
+              </a:buClr>
+              <a:buSzPct val="45000"/>
+              <a:buFont typeface="Wingdings" charset="2"/>
+              <a:buChar char=""/>
+            </a:pPr>
+            <a:r>
+              <a:rPr b="0" lang="de-DE" sz="2800" spc="-1" strike="noStrike">
+                <a:solidFill>
+                  <a:srgbClr val="000000"/>
+                </a:solidFill>
+                <a:uFill>
+                  <a:solidFill>
+                    <a:srgbClr val="ffffff"/>
+                  </a:solidFill>
+                </a:uFill>
+                <a:latin typeface="Calibri"/>
+              </a:rPr>
+              <a:t> </a:t>
+            </a:r>
+            <a:r>
+              <a:rPr b="0" lang="de-DE" sz="2800" spc="-1" strike="noStrike">
+                <a:solidFill>
+                  <a:srgbClr val="000000"/>
+                </a:solidFill>
+                <a:uFill>
+                  <a:solidFill>
+                    <a:srgbClr val="ffffff"/>
+                  </a:solidFill>
+                </a:uFill>
+                <a:latin typeface="Calibri"/>
+              </a:rPr>
+              <a:t>Es ist </a:t>
+            </a:r>
+            <a:r>
+              <a:rPr b="1" lang="de-DE" sz="2800" spc="-1" strike="noStrike">
+                <a:solidFill>
+                  <a:srgbClr val="000000"/>
+                </a:solidFill>
+                <a:uFill>
+                  <a:solidFill>
+                    <a:srgbClr val="ffffff"/>
+                  </a:solidFill>
+                </a:uFill>
+                <a:latin typeface="Calibri"/>
+              </a:rPr>
+              <a:t>keine Verbindung </a:t>
+            </a:r>
+            <a:r>
+              <a:rPr b="0" lang="de-DE" sz="2800" spc="-1" strike="noStrike">
+                <a:solidFill>
+                  <a:srgbClr val="000000"/>
+                </a:solidFill>
+                <a:uFill>
+                  <a:solidFill>
+                    <a:srgbClr val="ffffff"/>
+                  </a:solidFill>
+                </a:uFill>
+                <a:latin typeface="Calibri"/>
+              </a:rPr>
+              <a:t>zum Server</a:t>
+            </a:r>
+            <a:r>
+              <a:rPr b="0" lang="de-DE" sz="2800" spc="-1" strike="noStrike">
+                <a:solidFill>
+                  <a:srgbClr val="000000"/>
+                </a:solidFill>
+                <a:uFill>
+                  <a:solidFill>
+                    <a:srgbClr val="ffffff"/>
+                  </a:solidFill>
+                </a:uFill>
+                <a:latin typeface="Calibri"/>
+              </a:rPr>
+              <a:t> möglich.</a:t>
+            </a:r>
+            <a:endParaRPr b="0" lang="de-DE" sz="2800" spc="-1" strike="noStrike">
+              <a:solidFill>
+                <a:srgbClr val="000000"/>
+              </a:solidFill>
+              <a:uFill>
+                <a:solidFill>
+                  <a:srgbClr val="ffffff"/>
+                </a:solidFill>
+              </a:uFill>
+              <a:latin typeface="Calibri"/>
+            </a:endParaRPr>
+          </a:p>
+          <a:p>
+            <a:pPr marL="432000" indent="-324000">
+              <a:buClr>
+                <a:srgbClr val="000000"/>
+              </a:buClr>
+              <a:buSzPct val="45000"/>
+              <a:buFont typeface="Wingdings" charset="2"/>
+              <a:buChar char=""/>
+            </a:pPr>
+            <a:r>
+              <a:rPr b="0" lang="de-DE" sz="2800" spc="-1" strike="noStrike">
+                <a:solidFill>
+                  <a:srgbClr val="000000"/>
+                </a:solidFill>
+                <a:uFill>
+                  <a:solidFill>
+                    <a:srgbClr val="ffffff"/>
+                  </a:solidFill>
+                </a:uFill>
+                <a:latin typeface="Calibri"/>
+              </a:rPr>
+              <a:t> </a:t>
+            </a:r>
+            <a:r>
+              <a:rPr b="0" lang="de-DE" sz="2800" spc="-1" strike="noStrike">
+                <a:solidFill>
+                  <a:srgbClr val="000000"/>
+                </a:solidFill>
+                <a:uFill>
+                  <a:solidFill>
+                    <a:srgbClr val="ffffff"/>
+                  </a:solidFill>
+                </a:uFill>
+                <a:latin typeface="Calibri"/>
+              </a:rPr>
+              <a:t>Der Server ist </a:t>
+            </a:r>
+            <a:r>
+              <a:rPr b="1" lang="de-DE" sz="2800" spc="-1" strike="noStrike">
+                <a:solidFill>
+                  <a:srgbClr val="000000"/>
+                </a:solidFill>
+                <a:uFill>
+                  <a:solidFill>
+                    <a:srgbClr val="ffffff"/>
+                  </a:solidFill>
+                </a:uFill>
+                <a:latin typeface="Calibri"/>
+              </a:rPr>
+              <a:t>überlastet</a:t>
+            </a:r>
+            <a:r>
+              <a:rPr b="0" lang="de-DE" sz="2800" spc="-1" strike="noStrike">
+                <a:solidFill>
+                  <a:srgbClr val="000000"/>
+                </a:solidFill>
+                <a:uFill>
+                  <a:solidFill>
+                    <a:srgbClr val="ffffff"/>
+                  </a:solidFill>
+                </a:uFill>
+                <a:latin typeface="Calibri"/>
+              </a:rPr>
+              <a:t>.</a:t>
+            </a:r>
+            <a:endParaRPr b="0" lang="de-DE" sz="2800" spc="-1" strike="noStrike">
+              <a:solidFill>
+                <a:srgbClr val="000000"/>
+              </a:solidFill>
+              <a:uFill>
+                <a:solidFill>
+                  <a:srgbClr val="ffffff"/>
+                </a:solidFill>
+              </a:uFill>
+              <a:latin typeface="Calibri"/>
+            </a:endParaRPr>
+          </a:p>
+          <a:p>
+            <a:pPr marL="432000" indent="-324000">
+              <a:buClr>
+                <a:srgbClr val="000000"/>
+              </a:buClr>
+              <a:buSzPct val="45000"/>
+              <a:buFont typeface="Wingdings" charset="2"/>
+              <a:buChar char=""/>
+            </a:pPr>
+            <a:r>
+              <a:rPr b="0" lang="de-DE" sz="2800" spc="-1" strike="noStrike">
+                <a:solidFill>
+                  <a:srgbClr val="000000"/>
+                </a:solidFill>
+                <a:uFill>
+                  <a:solidFill>
+                    <a:srgbClr val="ffffff"/>
+                  </a:solidFill>
+                </a:uFill>
+                <a:latin typeface="Calibri"/>
+              </a:rPr>
+              <a:t> </a:t>
+            </a:r>
+            <a:r>
+              <a:rPr b="0" lang="de-DE" sz="2800" spc="-1" strike="noStrike">
+                <a:solidFill>
+                  <a:srgbClr val="000000"/>
+                </a:solidFill>
+                <a:uFill>
+                  <a:solidFill>
+                    <a:srgbClr val="ffffff"/>
+                  </a:solidFill>
+                </a:uFill>
+                <a:latin typeface="Calibri"/>
+              </a:rPr>
+              <a:t>Ein frei wählbarer </a:t>
+            </a:r>
+            <a:r>
+              <a:rPr b="1" lang="de-DE" sz="2800" spc="-1" strike="noStrike">
+                <a:solidFill>
+                  <a:srgbClr val="000000"/>
+                </a:solidFill>
+                <a:uFill>
+                  <a:solidFill>
+                    <a:srgbClr val="ffffff"/>
+                  </a:solidFill>
+                </a:uFill>
+                <a:latin typeface="Calibri"/>
+              </a:rPr>
+              <a:t>Bezeichner</a:t>
+            </a:r>
+            <a:r>
+              <a:rPr b="0" lang="de-DE" sz="2800" spc="-1" strike="noStrike">
+                <a:solidFill>
+                  <a:srgbClr val="000000"/>
+                </a:solidFill>
+                <a:uFill>
+                  <a:solidFill>
+                    <a:srgbClr val="ffffff"/>
+                  </a:solidFill>
+                </a:uFill>
+                <a:latin typeface="Calibri"/>
+              </a:rPr>
+              <a:t>, der als Schlüssel für die Datenbank verwendet wird, ist schon </a:t>
+            </a:r>
+            <a:r>
+              <a:rPr b="1" lang="de-DE" sz="2800" spc="-1" strike="noStrike">
+                <a:solidFill>
+                  <a:srgbClr val="000000"/>
+                </a:solidFill>
+                <a:uFill>
+                  <a:solidFill>
+                    <a:srgbClr val="ffffff"/>
+                  </a:solidFill>
+                </a:uFill>
+                <a:latin typeface="Calibri"/>
+              </a:rPr>
+              <a:t>belegt</a:t>
+            </a:r>
+            <a:r>
+              <a:rPr b="0" lang="de-DE" sz="2800" spc="-1" strike="noStrike">
+                <a:solidFill>
+                  <a:srgbClr val="000000"/>
+                </a:solidFill>
+                <a:uFill>
+                  <a:solidFill>
+                    <a:srgbClr val="ffffff"/>
+                  </a:solidFill>
+                </a:uFill>
+                <a:latin typeface="Calibri"/>
+              </a:rPr>
+              <a:t>.</a:t>
+            </a:r>
+            <a:endParaRPr b="0" lang="de-DE" sz="2800" spc="-1" strike="noStrike">
+              <a:solidFill>
+                <a:srgbClr val="000000"/>
+              </a:solidFill>
+              <a:uFill>
+                <a:solidFill>
+                  <a:srgbClr val="ffffff"/>
+                </a:solidFill>
+              </a:uFill>
+              <a:latin typeface="Calibri"/>
+            </a:endParaRPr>
+          </a:p>
+        </p:txBody>
+      </p:sp>
+      <p:sp>
+        <p:nvSpPr>
+          <p:cNvPr id="98" name="TextShape 3"/>
+          <p:cNvSpPr txBox="1"/>
+          <p:nvPr/>
+        </p:nvSpPr>
+        <p:spPr>
+          <a:xfrm>
+            <a:off x="6226200" y="1825560"/>
+            <a:ext cx="5131080" cy="4350960"/>
+          </a:xfrm>
+          <a:prstGeom prst="rect">
+            <a:avLst/>
+          </a:prstGeom>
+          <a:noFill/>
+          <a:ln>
+            <a:noFill/>
+          </a:ln>
+        </p:spPr>
+        <p:txBody>
+          <a:bodyPr lIns="0" rIns="0" tIns="0" bIns="0"/>
+          <a:p>
+            <a:pPr marL="432000" indent="-324000">
+              <a:buClr>
+                <a:srgbClr val="000000"/>
+              </a:buClr>
+              <a:buSzPct val="45000"/>
+              <a:buFont typeface="Wingdings" charset="2"/>
+              <a:buChar char=""/>
+            </a:pPr>
+            <a:r>
+              <a:rPr b="0" lang="de-DE" sz="2800" spc="-1" strike="noStrike">
+                <a:solidFill>
+                  <a:srgbClr val="000000"/>
+                </a:solidFill>
+                <a:uFill>
+                  <a:solidFill>
+                    <a:srgbClr val="ffffff"/>
+                  </a:solidFill>
+                </a:uFill>
+                <a:latin typeface="Calibri"/>
+              </a:rPr>
+              <a:t> </a:t>
+            </a:r>
+            <a:r>
+              <a:rPr b="0" lang="de-DE" sz="2800" spc="-1" strike="noStrike">
+                <a:solidFill>
+                  <a:srgbClr val="000000"/>
+                </a:solidFill>
+                <a:uFill>
+                  <a:solidFill>
+                    <a:srgbClr val="ffffff"/>
+                  </a:solidFill>
+                </a:uFill>
+                <a:latin typeface="Calibri"/>
+              </a:rPr>
+              <a:t>Der User </a:t>
+            </a:r>
+            <a:r>
+              <a:rPr b="1" lang="de-DE" sz="2800" spc="-1" strike="noStrike">
+                <a:solidFill>
+                  <a:srgbClr val="000000"/>
+                </a:solidFill>
+                <a:uFill>
+                  <a:solidFill>
+                    <a:srgbClr val="ffffff"/>
+                  </a:solidFill>
+                </a:uFill>
+                <a:latin typeface="Calibri"/>
+              </a:rPr>
+              <a:t>scheitert</a:t>
+            </a:r>
+            <a:r>
+              <a:rPr b="0" lang="de-DE" sz="2800" spc="-1" strike="noStrike">
+                <a:solidFill>
+                  <a:srgbClr val="000000"/>
+                </a:solidFill>
+                <a:uFill>
+                  <a:solidFill>
+                    <a:srgbClr val="ffffff"/>
+                  </a:solidFill>
+                </a:uFill>
+                <a:latin typeface="Calibri"/>
+              </a:rPr>
+              <a:t> </a:t>
+            </a:r>
+            <a:r>
+              <a:rPr b="1" lang="de-DE" sz="2800" spc="-1" strike="noStrike">
+                <a:solidFill>
+                  <a:srgbClr val="000000"/>
+                </a:solidFill>
+                <a:uFill>
+                  <a:solidFill>
+                    <a:srgbClr val="ffffff"/>
+                  </a:solidFill>
+                </a:uFill>
+                <a:latin typeface="Calibri"/>
+              </a:rPr>
+              <a:t>an</a:t>
+            </a:r>
+            <a:r>
+              <a:rPr b="0" lang="de-DE" sz="2800" spc="-1" strike="noStrike">
+                <a:solidFill>
+                  <a:srgbClr val="000000"/>
+                </a:solidFill>
+                <a:uFill>
+                  <a:solidFill>
+                    <a:srgbClr val="ffffff"/>
+                  </a:solidFill>
+                </a:uFill>
+                <a:latin typeface="Calibri"/>
+              </a:rPr>
+              <a:t> der </a:t>
+            </a:r>
+            <a:r>
+              <a:rPr b="1" lang="de-DE" sz="2800" spc="-1" strike="noStrike">
+                <a:solidFill>
+                  <a:srgbClr val="000000"/>
+                </a:solidFill>
+                <a:uFill>
+                  <a:solidFill>
+                    <a:srgbClr val="ffffff"/>
+                  </a:solidFill>
+                </a:uFill>
+                <a:latin typeface="Calibri"/>
+              </a:rPr>
+              <a:t>Eingabe</a:t>
+            </a:r>
+            <a:r>
+              <a:rPr b="0" lang="de-DE" sz="2800" spc="-1" strike="noStrike">
+                <a:solidFill>
+                  <a:srgbClr val="000000"/>
+                </a:solidFill>
+                <a:uFill>
+                  <a:solidFill>
+                    <a:srgbClr val="ffffff"/>
+                  </a:solidFill>
+                </a:uFill>
+                <a:latin typeface="Calibri"/>
+              </a:rPr>
+              <a:t> der Daten.</a:t>
+            </a:r>
+            <a:endParaRPr b="0" lang="de-DE" sz="2800" spc="-1" strike="noStrike">
+              <a:solidFill>
+                <a:srgbClr val="000000"/>
+              </a:solidFill>
+              <a:uFill>
+                <a:solidFill>
+                  <a:srgbClr val="ffffff"/>
+                </a:solidFill>
+              </a:uFill>
+              <a:latin typeface="Calibri"/>
+            </a:endParaRPr>
+          </a:p>
+          <a:p>
+            <a:pPr marL="432000" indent="-324000">
+              <a:buClr>
+                <a:srgbClr val="000000"/>
+              </a:buClr>
+              <a:buSzPct val="45000"/>
+              <a:buFont typeface="Wingdings" charset="2"/>
+              <a:buChar char=""/>
+            </a:pPr>
+            <a:r>
+              <a:rPr b="0" lang="de-DE" sz="2800" spc="-1" strike="noStrike">
+                <a:solidFill>
+                  <a:srgbClr val="000000"/>
+                </a:solidFill>
+                <a:uFill>
+                  <a:solidFill>
+                    <a:srgbClr val="ffffff"/>
+                  </a:solidFill>
+                </a:uFill>
+                <a:latin typeface="Calibri"/>
+              </a:rPr>
+              <a:t> </a:t>
+            </a:r>
+            <a:r>
+              <a:rPr b="0" lang="de-DE" sz="2800" spc="-1" strike="noStrike">
+                <a:solidFill>
+                  <a:srgbClr val="000000"/>
+                </a:solidFill>
+                <a:uFill>
+                  <a:solidFill>
+                    <a:srgbClr val="ffffff"/>
+                  </a:solidFill>
+                </a:uFill>
+                <a:latin typeface="Calibri"/>
+              </a:rPr>
+              <a:t>Die </a:t>
+            </a:r>
+            <a:r>
+              <a:rPr b="1" lang="de-DE" sz="2800" spc="-1" strike="noStrike">
+                <a:solidFill>
+                  <a:srgbClr val="000000"/>
+                </a:solidFill>
+                <a:uFill>
+                  <a:solidFill>
+                    <a:srgbClr val="ffffff"/>
+                  </a:solidFill>
+                </a:uFill>
+                <a:latin typeface="Calibri"/>
+              </a:rPr>
+              <a:t>Übermittlung</a:t>
+            </a:r>
+            <a:r>
+              <a:rPr b="0" lang="de-DE" sz="2800" spc="-1" strike="noStrike">
+                <a:solidFill>
+                  <a:srgbClr val="000000"/>
+                </a:solidFill>
+                <a:uFill>
+                  <a:solidFill>
+                    <a:srgbClr val="ffffff"/>
+                  </a:solidFill>
+                </a:uFill>
+                <a:latin typeface="Calibri"/>
+              </a:rPr>
+              <a:t> der Daten ist unvollständig/wird abgebrochen.</a:t>
+            </a:r>
+            <a:endParaRPr b="0" lang="de-DE" sz="2800" spc="-1" strike="noStrike">
+              <a:solidFill>
+                <a:srgbClr val="000000"/>
+              </a:solidFill>
+              <a:uFill>
+                <a:solidFill>
+                  <a:srgbClr val="ffffff"/>
+                </a:solidFill>
+              </a:uFill>
+              <a:latin typeface="Calibri"/>
+            </a:endParaRPr>
+          </a:p>
+          <a:p>
+            <a:pPr marL="432000" indent="-324000">
+              <a:buClr>
+                <a:srgbClr val="000000"/>
+              </a:buClr>
+              <a:buSzPct val="45000"/>
+              <a:buFont typeface="Wingdings" charset="2"/>
+              <a:buChar char=""/>
+            </a:pPr>
+            <a:r>
+              <a:rPr b="0" lang="de-DE" sz="2800" spc="-1" strike="noStrike">
+                <a:solidFill>
+                  <a:srgbClr val="000000"/>
+                </a:solidFill>
+                <a:uFill>
+                  <a:solidFill>
+                    <a:srgbClr val="ffffff"/>
+                  </a:solidFill>
+                </a:uFill>
+                <a:latin typeface="Calibri"/>
+              </a:rPr>
+              <a:t> </a:t>
+            </a:r>
+            <a:r>
+              <a:rPr b="0" lang="de-DE" sz="2800" spc="-1" strike="noStrike">
+                <a:solidFill>
+                  <a:srgbClr val="000000"/>
+                </a:solidFill>
+                <a:uFill>
+                  <a:solidFill>
+                    <a:srgbClr val="ffffff"/>
+                  </a:solidFill>
+                </a:uFill>
+                <a:latin typeface="Calibri"/>
+              </a:rPr>
+              <a:t>Der Server </a:t>
+            </a:r>
+            <a:r>
+              <a:rPr b="1" lang="de-DE" sz="2800" spc="-1" strike="noStrike">
+                <a:solidFill>
+                  <a:srgbClr val="000000"/>
+                </a:solidFill>
+                <a:uFill>
+                  <a:solidFill>
+                    <a:srgbClr val="ffffff"/>
+                  </a:solidFill>
+                </a:uFill>
+                <a:latin typeface="Calibri"/>
+              </a:rPr>
+              <a:t>verarbeitet</a:t>
+            </a:r>
+            <a:r>
+              <a:rPr b="0" lang="de-DE" sz="2800" spc="-1" strike="noStrike">
+                <a:solidFill>
+                  <a:srgbClr val="000000"/>
+                </a:solidFill>
+                <a:uFill>
+                  <a:solidFill>
+                    <a:srgbClr val="ffffff"/>
+                  </a:solidFill>
+                </a:uFill>
+                <a:latin typeface="Calibri"/>
+              </a:rPr>
+              <a:t> die Eingabedaten </a:t>
+            </a:r>
+            <a:r>
+              <a:rPr b="1" lang="de-DE" sz="2800" spc="-1" strike="noStrike">
+                <a:solidFill>
+                  <a:srgbClr val="000000"/>
+                </a:solidFill>
+                <a:uFill>
+                  <a:solidFill>
+                    <a:srgbClr val="ffffff"/>
+                  </a:solidFill>
+                </a:uFill>
+                <a:latin typeface="Calibri"/>
+              </a:rPr>
+              <a:t>fehlerhaft</a:t>
+            </a:r>
+            <a:r>
+              <a:rPr b="0" lang="de-DE" sz="2800" spc="-1" strike="noStrike">
+                <a:solidFill>
+                  <a:srgbClr val="000000"/>
+                </a:solidFill>
+                <a:uFill>
+                  <a:solidFill>
+                    <a:srgbClr val="ffffff"/>
+                  </a:solidFill>
+                </a:uFill>
+                <a:latin typeface="Calibri"/>
+              </a:rPr>
+              <a:t>.</a:t>
+            </a:r>
+            <a:endParaRPr b="0" lang="de-DE" sz="2800" spc="-1" strike="noStrike">
+              <a:solidFill>
+                <a:srgbClr val="000000"/>
+              </a:solidFill>
+              <a:uFill>
+                <a:solidFill>
+                  <a:srgbClr val="ffffff"/>
+                </a:solidFill>
+              </a:uFill>
+              <a:latin typeface="Calibri"/>
+            </a:endParaRPr>
+          </a:p>
+          <a:p>
+            <a:pPr marL="432000" indent="-324000">
+              <a:buClr>
+                <a:srgbClr val="000000"/>
+              </a:buClr>
+              <a:buSzPct val="45000"/>
+              <a:buFont typeface="Wingdings" charset="2"/>
+              <a:buChar char=""/>
+            </a:pPr>
+            <a:r>
+              <a:rPr b="0" lang="de-DE" sz="2800" spc="-1" strike="noStrike">
+                <a:solidFill>
+                  <a:srgbClr val="000000"/>
+                </a:solidFill>
+                <a:uFill>
+                  <a:solidFill>
+                    <a:srgbClr val="ffffff"/>
+                  </a:solidFill>
+                </a:uFill>
+                <a:latin typeface="Calibri"/>
+              </a:rPr>
+              <a:t> </a:t>
+            </a:r>
+            <a:r>
+              <a:rPr b="0" lang="de-DE" sz="2800" spc="-1" strike="noStrike">
+                <a:solidFill>
+                  <a:srgbClr val="000000"/>
+                </a:solidFill>
+                <a:uFill>
+                  <a:solidFill>
+                    <a:srgbClr val="ffffff"/>
+                  </a:solidFill>
+                </a:uFill>
+                <a:latin typeface="Calibri"/>
+              </a:rPr>
+              <a:t>Die erfolgreiche Registrierung mit Eintrag in die Datenbank kann nicht übermittelt werden, weil die </a:t>
+            </a:r>
+            <a:r>
+              <a:rPr b="1" lang="de-DE" sz="2800" spc="-1" strike="noStrike">
+                <a:solidFill>
+                  <a:srgbClr val="000000"/>
+                </a:solidFill>
+                <a:uFill>
+                  <a:solidFill>
+                    <a:srgbClr val="ffffff"/>
+                  </a:solidFill>
+                </a:uFill>
+                <a:latin typeface="Calibri"/>
+              </a:rPr>
+              <a:t>Internetverbindung</a:t>
+            </a:r>
+            <a:r>
+              <a:rPr b="0" lang="de-DE" sz="2800" spc="-1" strike="noStrike">
+                <a:solidFill>
+                  <a:srgbClr val="000000"/>
+                </a:solidFill>
+                <a:uFill>
+                  <a:solidFill>
+                    <a:srgbClr val="ffffff"/>
+                  </a:solidFill>
+                </a:uFill>
+                <a:latin typeface="Calibri"/>
+              </a:rPr>
+              <a:t> zwischenzeitlich </a:t>
+            </a:r>
+            <a:r>
+              <a:rPr b="1" lang="de-DE" sz="2800" spc="-1" strike="noStrike">
+                <a:solidFill>
+                  <a:srgbClr val="000000"/>
+                </a:solidFill>
+                <a:uFill>
+                  <a:solidFill>
+                    <a:srgbClr val="ffffff"/>
+                  </a:solidFill>
+                </a:uFill>
+                <a:latin typeface="Calibri"/>
+              </a:rPr>
+              <a:t>abgebrochen</a:t>
+            </a:r>
+            <a:r>
+              <a:rPr b="0" lang="de-DE" sz="2800" spc="-1" strike="noStrike">
+                <a:solidFill>
+                  <a:srgbClr val="000000"/>
+                </a:solidFill>
+                <a:uFill>
+                  <a:solidFill>
+                    <a:srgbClr val="ffffff"/>
+                  </a:solidFill>
+                </a:uFill>
+                <a:latin typeface="Calibri"/>
+              </a:rPr>
+              <a:t> ist.</a:t>
+            </a:r>
+            <a:endParaRPr b="0" lang="de-DE" sz="2800" spc="-1" strike="noStrike">
+              <a:solidFill>
+                <a:srgbClr val="000000"/>
+              </a:solidFill>
+              <a:uFill>
+                <a:solidFill>
+                  <a:srgbClr val="ffffff"/>
+                </a:solidFill>
+              </a:uFill>
+              <a:latin typeface="Calibri"/>
+            </a:endParaRPr>
+          </a:p>
+          <a:p>
+            <a:pPr marL="432000" indent="-324000">
+              <a:buClr>
+                <a:srgbClr val="000000"/>
+              </a:buClr>
+              <a:buSzPct val="45000"/>
+              <a:buFont typeface="Wingdings" charset="2"/>
+              <a:buChar char=""/>
+            </a:pPr>
+            <a:r>
+              <a:rPr b="0" lang="de-DE" sz="2800" spc="-1" strike="noStrike">
+                <a:solidFill>
+                  <a:srgbClr val="000000"/>
+                </a:solidFill>
+                <a:uFill>
+                  <a:solidFill>
+                    <a:srgbClr val="ffffff"/>
+                  </a:solidFill>
+                </a:uFill>
+                <a:latin typeface="Calibri"/>
+              </a:rPr>
+              <a:t> </a:t>
+            </a:r>
+            <a:r>
+              <a:rPr b="0" lang="de-DE" sz="2800" spc="-1" strike="noStrike">
+                <a:solidFill>
+                  <a:srgbClr val="000000"/>
+                </a:solidFill>
+                <a:uFill>
+                  <a:solidFill>
+                    <a:srgbClr val="ffffff"/>
+                  </a:solidFill>
+                </a:uFill>
+                <a:latin typeface="Calibri"/>
+              </a:rPr>
+              <a:t>Die </a:t>
+            </a:r>
+            <a:r>
+              <a:rPr b="1" lang="de-DE" sz="2800" spc="-1" strike="noStrike">
+                <a:solidFill>
+                  <a:srgbClr val="000000"/>
+                </a:solidFill>
+                <a:uFill>
+                  <a:solidFill>
+                    <a:srgbClr val="ffffff"/>
+                  </a:solidFill>
+                </a:uFill>
+                <a:latin typeface="Calibri"/>
+              </a:rPr>
+              <a:t>App</a:t>
+            </a:r>
+            <a:r>
+              <a:rPr b="0" lang="de-DE" sz="2800" spc="-1" strike="noStrike">
+                <a:solidFill>
+                  <a:srgbClr val="000000"/>
+                </a:solidFill>
+                <a:uFill>
+                  <a:solidFill>
+                    <a:srgbClr val="ffffff"/>
+                  </a:solidFill>
+                </a:uFill>
+                <a:latin typeface="Calibri"/>
+              </a:rPr>
+              <a:t> wurde zwischenzeitlich </a:t>
+            </a:r>
+            <a:r>
+              <a:rPr b="1" lang="de-DE" sz="2800" spc="-1" strike="noStrike">
+                <a:solidFill>
+                  <a:srgbClr val="000000"/>
+                </a:solidFill>
+                <a:uFill>
+                  <a:solidFill>
+                    <a:srgbClr val="ffffff"/>
+                  </a:solidFill>
+                </a:uFill>
+                <a:latin typeface="Calibri"/>
+              </a:rPr>
+              <a:t>beendet</a:t>
+            </a:r>
+            <a:r>
+              <a:rPr b="0" lang="de-DE" sz="2800" spc="-1" strike="noStrike">
+                <a:solidFill>
+                  <a:srgbClr val="000000"/>
+                </a:solidFill>
+                <a:uFill>
+                  <a:solidFill>
+                    <a:srgbClr val="ffffff"/>
+                  </a:solidFill>
+                </a:uFill>
+                <a:latin typeface="Calibri"/>
+              </a:rPr>
+              <a:t>, die erfolgreiche Registrierung kann nicht übermittelt werden.</a:t>
+            </a:r>
+            <a:endParaRPr b="0" lang="de-DE" sz="2800" spc="-1" strike="noStrike">
+              <a:solidFill>
+                <a:srgbClr val="000000"/>
+              </a:solidFill>
+              <a:uFill>
+                <a:solidFill>
+                  <a:srgbClr val="ffffff"/>
+                </a:solidFill>
+              </a:uFill>
+              <a:latin typeface="Calibri"/>
+            </a:endParaRPr>
+          </a:p>
+        </p:txBody>
+      </p:sp>
+    </p:spTree>
+  </p:cSld>
+</p:sld>
+</file>
+
+<file path=ppt/slides/slide11.xml><?xml version="1.0" encoding="utf-8"?>
+<p:sld xmlns:a="http://schemas.openxmlformats.org/drawingml/2006/main" xmlns:p="http://schemas.openxmlformats.org/presentationml/2006/main" xmlns:r="http://schemas.openxmlformats.org/officeDocument/2006/relationships" xmlns:p14="http://schemas.microsoft.com/office/powerpoint/2010/main" xmlns:p15="http://schemas.microsoft.com/office/powerpoint/2012/main" xmlns:mc="http://schemas.openxmlformats.org/markup-compatibility/2006">
+  <p:cSld>
+    <p:spTree>
+      <p:nvGrpSpPr>
+        <p:cNvPr id="1" name=""/>
+        <p:cNvGrpSpPr/>
+        <p:nvPr/>
+      </p:nvGrpSpPr>
+      <p:grpSpPr>
+        <a:xfrm>
+          <a:off x="0" y="0"/>
+          <a:ext cx="0" cy="0"/>
+          <a:chOff x="0" y="0"/>
+          <a:chExt cx="0" cy="0"/>
+        </a:xfrm>
+      </p:grpSpPr>
+      <p:sp>
+        <p:nvSpPr>
+          <p:cNvPr id="99" name="TextShape 1"/>
+          <p:cNvSpPr txBox="1"/>
+          <p:nvPr/>
+        </p:nvSpPr>
+        <p:spPr>
+          <a:xfrm>
+            <a:off x="838080" y="365040"/>
+            <a:ext cx="10515240" cy="1325160"/>
+          </a:xfrm>
+          <a:prstGeom prst="rect">
+            <a:avLst/>
+          </a:prstGeom>
+          <a:noFill/>
+          <a:ln>
+            <a:noFill/>
+          </a:ln>
+        </p:spPr>
+        <p:txBody>
+          <a:bodyPr lIns="0" rIns="0" tIns="0" bIns="0" anchor="ctr"/>
+          <a:p>
+            <a:pPr algn="ctr"/>
+            <a:r>
+              <a:rPr b="0" lang="de-DE" sz="4400" spc="-1" strike="noStrike">
+                <a:solidFill>
+                  <a:srgbClr val="000000"/>
+                </a:solidFill>
+                <a:uFill>
+                  <a:solidFill>
+                    <a:srgbClr val="ffffff"/>
+                  </a:solidFill>
+                </a:uFill>
+                <a:latin typeface="Calibri"/>
+              </a:rPr>
+              <a:t>Registrierung</a:t>
+            </a:r>
+            <a:endParaRPr b="0" lang="de-DE" sz="4400" spc="-1" strike="noStrike">
+              <a:solidFill>
+                <a:srgbClr val="000000"/>
+              </a:solidFill>
+              <a:uFill>
+                <a:solidFill>
+                  <a:srgbClr val="ffffff"/>
+                </a:solidFill>
+              </a:uFill>
+              <a:latin typeface="Calibri"/>
+            </a:endParaRPr>
+          </a:p>
+        </p:txBody>
+      </p:sp>
+      <p:sp>
+        <p:nvSpPr>
+          <p:cNvPr id="100" name="TextShape 2"/>
+          <p:cNvSpPr txBox="1"/>
+          <p:nvPr/>
+        </p:nvSpPr>
+        <p:spPr>
+          <a:xfrm>
+            <a:off x="838080" y="1825560"/>
+            <a:ext cx="5131080" cy="4350960"/>
+          </a:xfrm>
+          <a:prstGeom prst="rect">
+            <a:avLst/>
+          </a:prstGeom>
+          <a:noFill/>
+          <a:ln>
+            <a:noFill/>
+          </a:ln>
+        </p:spPr>
+        <p:txBody>
+          <a:bodyPr lIns="0" rIns="0" tIns="0" bIns="0" anchor="ctr"/>
+          <a:p>
+            <a:pPr marL="432000" indent="-324000">
+              <a:lnSpc>
+                <a:spcPct val="150000"/>
+              </a:lnSpc>
+              <a:buClr>
+                <a:srgbClr val="000000"/>
+              </a:buClr>
+              <a:buSzPct val="45000"/>
+              <a:buFont typeface="Wingdings" charset="2"/>
+              <a:buChar char=""/>
+            </a:pPr>
+            <a:r>
+              <a:rPr b="0" lang="de-DE" sz="2800" spc="-1" strike="noStrike">
+                <a:solidFill>
+                  <a:srgbClr val="000000"/>
+                </a:solidFill>
+                <a:uFill>
+                  <a:solidFill>
+                    <a:srgbClr val="ffffff"/>
+                  </a:solidFill>
+                </a:uFill>
+                <a:latin typeface="Calibri"/>
+              </a:rPr>
+              <a:t>Andere Aktivitäten</a:t>
+            </a:r>
+            <a:endParaRPr b="0" lang="de-DE" sz="2800" spc="-1" strike="noStrike">
+              <a:solidFill>
+                <a:srgbClr val="000000"/>
+              </a:solidFill>
+              <a:uFill>
+                <a:solidFill>
+                  <a:srgbClr val="ffffff"/>
+                </a:solidFill>
+              </a:uFill>
+              <a:latin typeface="Calibri"/>
+            </a:endParaRPr>
+          </a:p>
+          <a:p>
+            <a:pPr lvl="1" marL="864000" indent="-324000">
+              <a:lnSpc>
+                <a:spcPct val="150000"/>
+              </a:lnSpc>
+              <a:buClr>
+                <a:srgbClr val="000000"/>
+              </a:buClr>
+              <a:buSzPct val="75000"/>
+              <a:buFont typeface="Symbol" charset="2"/>
+              <a:buChar char=""/>
+            </a:pPr>
+            <a:r>
+              <a:rPr b="0" lang="de-DE" sz="2000" spc="-1" strike="noStrike">
+                <a:solidFill>
+                  <a:srgbClr val="000000"/>
+                </a:solidFill>
+                <a:uFill>
+                  <a:solidFill>
+                    <a:srgbClr val="ffffff"/>
+                  </a:solidFill>
+                </a:uFill>
+                <a:latin typeface="Calibri"/>
+              </a:rPr>
+              <a:t>gleichzeitige Registrierung</a:t>
+            </a:r>
+            <a:endParaRPr b="0" lang="de-DE" sz="2000" spc="-1" strike="noStrike">
+              <a:solidFill>
+                <a:srgbClr val="000000"/>
+              </a:solidFill>
+              <a:uFill>
+                <a:solidFill>
+                  <a:srgbClr val="ffffff"/>
+                </a:solidFill>
+              </a:uFill>
+              <a:latin typeface="Calibri"/>
+            </a:endParaRPr>
+          </a:p>
+          <a:p>
+            <a:pPr lvl="1" marL="864000" indent="-324000">
+              <a:lnSpc>
+                <a:spcPct val="150000"/>
+              </a:lnSpc>
+              <a:buClr>
+                <a:srgbClr val="000000"/>
+              </a:buClr>
+              <a:buSzPct val="75000"/>
+              <a:buFont typeface="Symbol" charset="2"/>
+              <a:buChar char=""/>
+            </a:pPr>
+            <a:r>
+              <a:rPr b="0" lang="de-DE" sz="2000" spc="-1" strike="noStrike">
+                <a:solidFill>
+                  <a:srgbClr val="000000"/>
+                </a:solidFill>
+                <a:uFill>
+                  <a:solidFill>
+                    <a:srgbClr val="ffffff"/>
+                  </a:solidFill>
+                </a:uFill>
+                <a:latin typeface="Calibri"/>
+              </a:rPr>
+              <a:t>evtl mit gleichem Schlüssel</a:t>
+            </a:r>
+            <a:endParaRPr b="0" lang="de-DE" sz="2000" spc="-1" strike="noStrike">
+              <a:solidFill>
+                <a:srgbClr val="000000"/>
+              </a:solidFill>
+              <a:uFill>
+                <a:solidFill>
+                  <a:srgbClr val="ffffff"/>
+                </a:solidFill>
+              </a:uFill>
+              <a:latin typeface="Calibri"/>
+            </a:endParaRPr>
+          </a:p>
+          <a:p>
+            <a:pPr lvl="1" marL="864000" indent="-324000">
+              <a:lnSpc>
+                <a:spcPct val="150000"/>
+              </a:lnSpc>
+              <a:buClr>
+                <a:srgbClr val="000000"/>
+              </a:buClr>
+              <a:buSzPct val="75000"/>
+              <a:buFont typeface="Symbol" charset="2"/>
+              <a:buChar char=""/>
+            </a:pPr>
+            <a:r>
+              <a:rPr b="0" lang="de-DE" sz="2000" spc="-1" strike="noStrike">
+                <a:solidFill>
+                  <a:srgbClr val="000000"/>
+                </a:solidFill>
+                <a:uFill>
+                  <a:solidFill>
+                    <a:srgbClr val="ffffff"/>
+                  </a:solidFill>
+                </a:uFill>
+                <a:latin typeface="Calibri"/>
+              </a:rPr>
+              <a:t>zu viele gleichzeitige Anfragen</a:t>
+            </a:r>
+            <a:endParaRPr b="0" lang="de-DE" sz="2000" spc="-1" strike="noStrike">
+              <a:solidFill>
+                <a:srgbClr val="000000"/>
+              </a:solidFill>
+              <a:uFill>
+                <a:solidFill>
+                  <a:srgbClr val="ffffff"/>
+                </a:solidFill>
+              </a:uFill>
+              <a:latin typeface="Calibri"/>
+            </a:endParaRPr>
+          </a:p>
+          <a:p>
+            <a:pPr lvl="1" marL="864000" indent="-324000">
+              <a:lnSpc>
+                <a:spcPct val="150000"/>
+              </a:lnSpc>
+              <a:buClr>
+                <a:srgbClr val="000000"/>
+              </a:buClr>
+              <a:buSzPct val="75000"/>
+              <a:buFont typeface="Symbol" charset="2"/>
+              <a:buChar char=""/>
+            </a:pPr>
+            <a:r>
+              <a:rPr b="0" lang="de-DE" sz="2000" spc="-1" strike="noStrike">
+                <a:solidFill>
+                  <a:srgbClr val="000000"/>
+                </a:solidFill>
+                <a:uFill>
+                  <a:solidFill>
+                    <a:srgbClr val="ffffff"/>
+                  </a:solidFill>
+                </a:uFill>
+                <a:latin typeface="Calibri"/>
+              </a:rPr>
+              <a:t>Abfrage des Datensatzes (vor Vollständigkeit)</a:t>
+            </a:r>
+            <a:endParaRPr b="0" lang="de-DE" sz="2000" spc="-1" strike="noStrike">
+              <a:solidFill>
+                <a:srgbClr val="000000"/>
+              </a:solidFill>
+              <a:uFill>
+                <a:solidFill>
+                  <a:srgbClr val="ffffff"/>
+                </a:solidFill>
+              </a:uFill>
+              <a:latin typeface="Calibri"/>
+            </a:endParaRPr>
+          </a:p>
+        </p:txBody>
+      </p:sp>
+      <p:sp>
+        <p:nvSpPr>
+          <p:cNvPr id="101" name="TextShape 3"/>
+          <p:cNvSpPr txBox="1"/>
+          <p:nvPr/>
+        </p:nvSpPr>
+        <p:spPr>
+          <a:xfrm>
+            <a:off x="6226200" y="1825560"/>
+            <a:ext cx="5131080" cy="4350960"/>
+          </a:xfrm>
+          <a:prstGeom prst="rect">
+            <a:avLst/>
+          </a:prstGeom>
+          <a:noFill/>
+          <a:ln>
+            <a:noFill/>
+          </a:ln>
+        </p:spPr>
+        <p:txBody>
+          <a:bodyPr lIns="0" rIns="0" tIns="0" bIns="0" anchor="ctr"/>
+          <a:p>
+            <a:pPr marL="432000" indent="-324000">
+              <a:lnSpc>
+                <a:spcPct val="150000"/>
+              </a:lnSpc>
+              <a:buClr>
+                <a:srgbClr val="000000"/>
+              </a:buClr>
+              <a:buSzPct val="45000"/>
+              <a:buFont typeface="Wingdings" charset="2"/>
+              <a:buChar char=""/>
+            </a:pPr>
+            <a:r>
+              <a:rPr b="0" lang="de-DE" sz="2800" spc="-1" strike="noStrike">
+                <a:solidFill>
+                  <a:srgbClr val="000000"/>
+                </a:solidFill>
+                <a:uFill>
+                  <a:solidFill>
+                    <a:srgbClr val="ffffff"/>
+                  </a:solidFill>
+                </a:uFill>
+                <a:latin typeface="Calibri"/>
+              </a:rPr>
+              <a:t>Zustand bei Erfolg</a:t>
+            </a:r>
+            <a:endParaRPr b="0" lang="de-DE" sz="2800" spc="-1" strike="noStrike">
+              <a:solidFill>
+                <a:srgbClr val="000000"/>
+              </a:solidFill>
+              <a:uFill>
+                <a:solidFill>
+                  <a:srgbClr val="ffffff"/>
+                </a:solidFill>
+              </a:uFill>
+              <a:latin typeface="Calibri"/>
+            </a:endParaRPr>
+          </a:p>
+          <a:p>
+            <a:pPr lvl="1" marL="864000" indent="-324000">
+              <a:lnSpc>
+                <a:spcPct val="150000"/>
+              </a:lnSpc>
+              <a:buClr>
+                <a:srgbClr val="000000"/>
+              </a:buClr>
+              <a:buSzPct val="75000"/>
+              <a:buFont typeface="Symbol" charset="2"/>
+              <a:buChar char=""/>
+            </a:pPr>
+            <a:r>
+              <a:rPr b="0" lang="de-DE" sz="2000" spc="-1" strike="noStrike">
+                <a:solidFill>
+                  <a:srgbClr val="000000"/>
+                </a:solidFill>
+                <a:uFill>
+                  <a:solidFill>
+                    <a:srgbClr val="ffffff"/>
+                  </a:solidFill>
+                </a:uFill>
+                <a:latin typeface="Calibri"/>
+              </a:rPr>
+              <a:t>User hat Datenbankeintrag</a:t>
+            </a:r>
+            <a:endParaRPr b="0" lang="de-DE" sz="2000" spc="-1" strike="noStrike">
+              <a:solidFill>
+                <a:srgbClr val="000000"/>
+              </a:solidFill>
+              <a:uFill>
+                <a:solidFill>
+                  <a:srgbClr val="ffffff"/>
+                </a:solidFill>
+              </a:uFill>
+              <a:latin typeface="Calibri"/>
+            </a:endParaRPr>
+          </a:p>
+          <a:p>
+            <a:pPr lvl="1" marL="864000" indent="-324000">
+              <a:lnSpc>
+                <a:spcPct val="150000"/>
+              </a:lnSpc>
+              <a:buClr>
+                <a:srgbClr val="000000"/>
+              </a:buClr>
+              <a:buSzPct val="75000"/>
+              <a:buFont typeface="Symbol" charset="2"/>
+              <a:buChar char=""/>
+            </a:pPr>
+            <a:r>
+              <a:rPr b="0" lang="de-DE" sz="2000" spc="-1" strike="noStrike">
+                <a:solidFill>
+                  <a:srgbClr val="000000"/>
+                </a:solidFill>
+                <a:uFill>
+                  <a:solidFill>
+                    <a:srgbClr val="ffffff"/>
+                  </a:solidFill>
+                </a:uFill>
+                <a:latin typeface="Calibri"/>
+              </a:rPr>
+              <a:t>User ist in der App eingeloggt</a:t>
+            </a:r>
+            <a:endParaRPr b="0" lang="de-DE" sz="2000" spc="-1" strike="noStrike">
+              <a:solidFill>
+                <a:srgbClr val="000000"/>
+              </a:solidFill>
+              <a:uFill>
+                <a:solidFill>
+                  <a:srgbClr val="ffffff"/>
+                </a:solidFill>
+              </a:uFill>
+              <a:latin typeface="Calibri"/>
+            </a:endParaRPr>
+          </a:p>
+          <a:p>
+            <a:pPr lvl="1" marL="864000" indent="-324000">
+              <a:lnSpc>
+                <a:spcPct val="150000"/>
+              </a:lnSpc>
+              <a:buClr>
+                <a:srgbClr val="000000"/>
+              </a:buClr>
+              <a:buSzPct val="75000"/>
+              <a:buFont typeface="Symbol" charset="2"/>
+              <a:buChar char=""/>
+            </a:pPr>
+            <a:r>
+              <a:rPr b="0" lang="de-DE" sz="2000" spc="-1" strike="noStrike">
+                <a:solidFill>
+                  <a:srgbClr val="000000"/>
+                </a:solidFill>
+                <a:uFill>
+                  <a:solidFill>
+                    <a:srgbClr val="ffffff"/>
+                  </a:solidFill>
+                </a:uFill>
+                <a:latin typeface="Calibri"/>
+              </a:rPr>
+              <a:t>Server und Client sind bereit zur Kommunikation</a:t>
+            </a:r>
+            <a:endParaRPr b="0" lang="de-DE" sz="2000" spc="-1" strike="noStrike">
+              <a:solidFill>
+                <a:srgbClr val="000000"/>
+              </a:solidFill>
+              <a:uFill>
+                <a:solidFill>
+                  <a:srgbClr val="ffffff"/>
+                </a:solidFill>
+              </a:uFill>
+              <a:latin typeface="Calibri"/>
+            </a:endParaRPr>
+          </a:p>
+        </p:txBody>
+      </p:sp>
+    </p:spTree>
+  </p:cSld>
+  <p:timing>
+    <p:tnLst>
+      <p:par>
+        <p:cTn id="17" dur="indefinite" restart="never" nodeType="tmRoot">
+          <p:childTnLst>
+            <p:seq>
+              <p:cTn id="18" nodeType="mainSeq"/>
               <p:prevCondLst>
                 <p:cond delay="0" evt="onPrev">
                   <p:tgtEl>
@@ -5672,9 +7338,9 @@
           <p:nvPr/>
         </p:nvSpPr>
         <p:spPr>
-          <a:xfrm>
+          <a:xfrm rot="10800000">
             <a:off x="838080" y="365040"/>
-            <a:ext cx="10515240" cy="1325160"/>
+            <a:ext cx="1095120" cy="603000"/>
           </a:xfrm>
           <a:prstGeom prst="rect">
             <a:avLst/>
@@ -5687,67 +7353,48 @@
         <p:txBody>
           <a:bodyPr anchor="ctr"/>
           <a:p>
+            <a:endParaRPr b="0" lang="de-DE" sz="1800" spc="-1" strike="noStrike">
+              <a:solidFill>
+                <a:srgbClr val="000000"/>
+              </a:solidFill>
+              <a:uFill>
+                <a:solidFill>
+                  <a:srgbClr val="ffffff"/>
+                </a:solidFill>
+              </a:uFill>
+              <a:latin typeface="Calibri"/>
+            </a:endParaRPr>
+          </a:p>
+        </p:txBody>
+      </p:sp>
+      <p:sp>
+        <p:nvSpPr>
+          <p:cNvPr id="86" name="TextShape 2"/>
+          <p:cNvSpPr txBox="1"/>
+          <p:nvPr/>
+        </p:nvSpPr>
+        <p:spPr>
+          <a:xfrm>
+            <a:off x="838080" y="365040"/>
+            <a:ext cx="10515240" cy="5811480"/>
+          </a:xfrm>
+          <a:prstGeom prst="rect">
+            <a:avLst/>
+          </a:prstGeom>
+          <a:noFill/>
+          <a:ln>
+            <a:noFill/>
+          </a:ln>
+        </p:spPr>
+        <p:txBody>
+          <a:bodyPr/>
+          <a:p>
             <a:pPr algn="ctr">
               <a:lnSpc>
                 <a:spcPct val="100000"/>
               </a:lnSpc>
             </a:pPr>
             <a:r>
-              <a:rPr b="0" lang="de-DE" sz="4400" spc="-1" strike="noStrike">
-                <a:solidFill>
-                  <a:srgbClr val="000000"/>
-                </a:solidFill>
-                <a:uFill>
-                  <a:solidFill>
-                    <a:srgbClr val="ffffff"/>
-                  </a:solidFill>
-                </a:uFill>
-                <a:latin typeface="Calibri Light"/>
-              </a:rPr>
-              <a:t>Systemrequirements</a:t>
-            </a:r>
-            <a:endParaRPr b="0" lang="de-DE" sz="1800" spc="-1" strike="noStrike">
-              <a:solidFill>
-                <a:srgbClr val="000000"/>
-              </a:solidFill>
-              <a:uFill>
-                <a:solidFill>
-                  <a:srgbClr val="ffffff"/>
-                </a:solidFill>
-              </a:uFill>
-              <a:latin typeface="Calibri"/>
-            </a:endParaRPr>
-          </a:p>
-        </p:txBody>
-      </p:sp>
-      <p:sp>
-        <p:nvSpPr>
-          <p:cNvPr id="86" name="TextShape 2"/>
-          <p:cNvSpPr txBox="1"/>
-          <p:nvPr/>
-        </p:nvSpPr>
-        <p:spPr>
-          <a:xfrm>
-            <a:off x="838080" y="1825560"/>
-            <a:ext cx="10515240" cy="4350960"/>
-          </a:xfrm>
-          <a:prstGeom prst="rect">
-            <a:avLst/>
-          </a:prstGeom>
-          <a:noFill/>
-          <a:ln>
-            <a:noFill/>
-          </a:ln>
-        </p:spPr>
-        <p:txBody>
-          <a:bodyPr/>
-          <a:p>
-            <a:pPr algn="ctr">
-              <a:lnSpc>
-                <a:spcPct val="100000"/>
-              </a:lnSpc>
-            </a:pPr>
-            <a:r>
               <a:rPr b="1" lang="de-DE" sz="2800" spc="-1" strike="noStrike">
                 <a:solidFill>
                   <a:srgbClr val="000000"/>
@@ -5759,7 +7406,7 @@
                 </a:uFill>
                 <a:latin typeface="Calibri"/>
               </a:rPr>
-              <a:t>Non-Functional</a:t>
+              <a:t>Functional</a:t>
             </a:r>
             <a:r>
               <a:rPr b="0" lang="de-DE" sz="2800" spc="-1" strike="noStrike">
@@ -5775,24 +7422,6 @@
               </a:rPr>
               <a:t> System Requirements</a:t>
             </a:r>
-            <a:endParaRPr b="0" lang="de-DE" sz="2800" spc="-1" strike="noStrike">
-              <a:solidFill>
-                <a:srgbClr val="000000"/>
-              </a:solidFill>
-              <a:uFill>
-                <a:solidFill>
-                  <a:srgbClr val="ffffff"/>
-                </a:solidFill>
-              </a:uFill>
-              <a:latin typeface="Calibri"/>
-            </a:endParaRPr>
-          </a:p>
-          <a:p>
-            <a:pPr>
-              <a:lnSpc>
-                <a:spcPct val="100000"/>
-              </a:lnSpc>
-            </a:pPr>
             <a:endParaRPr b="0" lang="de-DE" sz="2800" spc="-1" strike="noStrike">
               <a:solidFill>
                 <a:srgbClr val="000000"/>
@@ -5828,7 +7457,7 @@
                 </a:uFill>
                 <a:latin typeface="Calibri"/>
               </a:rPr>
-              <a:t>Product Requirements</a:t>
+              <a:t>Technische Anforderungen </a:t>
             </a:r>
             <a:endParaRPr b="0" lang="de-DE" sz="2800" spc="-1" strike="noStrike">
               <a:solidFill>
@@ -5865,7 +7494,7 @@
                 </a:uFill>
                 <a:latin typeface="Calibri"/>
               </a:rPr>
-              <a:t>Usability Requirements</a:t>
+              <a:t>Benutzer</a:t>
             </a:r>
             <a:endParaRPr b="0" lang="de-DE" sz="2800" spc="-1" strike="noStrike">
               <a:solidFill>
@@ -5902,7 +7531,7 @@
                 </a:uFill>
                 <a:latin typeface="Calibri"/>
               </a:rPr>
-              <a:t>Efficiency Requirements</a:t>
+              <a:t>System Administrator</a:t>
             </a:r>
             <a:endParaRPr b="0" lang="de-DE" sz="2800" spc="-1" strike="noStrike">
               <a:solidFill>
@@ -5939,7 +7568,266 @@
                 </a:uFill>
                 <a:latin typeface="Calibri"/>
               </a:rPr>
-              <a:t>Performance Requirements</a:t>
+              <a:t>Administrator</a:t>
+            </a:r>
+            <a:endParaRPr b="0" lang="de-DE" sz="2800" spc="-1" strike="noStrike">
+              <a:solidFill>
+                <a:srgbClr val="000000"/>
+              </a:solidFill>
+              <a:uFill>
+                <a:solidFill>
+                  <a:srgbClr val="ffffff"/>
+                </a:solidFill>
+              </a:uFill>
+              <a:latin typeface="Calibri"/>
+            </a:endParaRPr>
+          </a:p>
+          <a:p>
+            <a:pPr marL="228600" indent="-228240">
+              <a:lnSpc>
+                <a:spcPct val="90000"/>
+              </a:lnSpc>
+              <a:buClr>
+                <a:srgbClr val="000000"/>
+              </a:buClr>
+              <a:buFont typeface="Arial"/>
+              <a:buChar char="•"/>
+            </a:pPr>
+            <a:r>
+              <a:rPr b="0" lang="de-DE" sz="2800" spc="-1" strike="noStrike">
+                <a:solidFill>
+                  <a:srgbClr val="000000"/>
+                </a:solidFill>
+                <a:uFill>
+                  <a:solidFill>
+                    <a:srgbClr val="ffffff"/>
+                  </a:solidFill>
+                </a:uFill>
+                <a:latin typeface="Calibri"/>
+              </a:rPr>
+              <a:t>Clients</a:t>
+            </a:r>
+            <a:endParaRPr b="0" lang="de-DE" sz="2800" spc="-1" strike="noStrike">
+              <a:solidFill>
+                <a:srgbClr val="000000"/>
+              </a:solidFill>
+              <a:uFill>
+                <a:solidFill>
+                  <a:srgbClr val="ffffff"/>
+                </a:solidFill>
+              </a:uFill>
+              <a:latin typeface="Calibri"/>
+            </a:endParaRPr>
+          </a:p>
+          <a:p>
+            <a:pPr marL="228600" indent="-228240">
+              <a:lnSpc>
+                <a:spcPct val="90000"/>
+              </a:lnSpc>
+              <a:buClr>
+                <a:srgbClr val="000000"/>
+              </a:buClr>
+              <a:buFont typeface="Arial"/>
+              <a:buChar char="•"/>
+            </a:pPr>
+            <a:r>
+              <a:rPr b="0" lang="de-DE" sz="2800" spc="-1" strike="noStrike">
+                <a:solidFill>
+                  <a:srgbClr val="000000"/>
+                </a:solidFill>
+                <a:uFill>
+                  <a:solidFill>
+                    <a:srgbClr val="ffffff"/>
+                  </a:solidFill>
+                </a:uFill>
+                <a:latin typeface="Calibri"/>
+              </a:rPr>
+              <a:t>Experiment – Erstellung </a:t>
+            </a:r>
+            <a:endParaRPr b="0" lang="de-DE" sz="2800" spc="-1" strike="noStrike">
+              <a:solidFill>
+                <a:srgbClr val="000000"/>
+              </a:solidFill>
+              <a:uFill>
+                <a:solidFill>
+                  <a:srgbClr val="ffffff"/>
+                </a:solidFill>
+              </a:uFill>
+              <a:latin typeface="Calibri"/>
+            </a:endParaRPr>
+          </a:p>
+          <a:p>
+            <a:pPr marL="228600" indent="-228240">
+              <a:lnSpc>
+                <a:spcPct val="90000"/>
+              </a:lnSpc>
+              <a:buClr>
+                <a:srgbClr val="000000"/>
+              </a:buClr>
+              <a:buFont typeface="Arial"/>
+              <a:buChar char="•"/>
+            </a:pPr>
+            <a:r>
+              <a:rPr b="0" lang="de-DE" sz="2800" spc="-1" strike="noStrike">
+                <a:solidFill>
+                  <a:srgbClr val="000000"/>
+                </a:solidFill>
+                <a:uFill>
+                  <a:solidFill>
+                    <a:srgbClr val="ffffff"/>
+                  </a:solidFill>
+                </a:uFill>
+                <a:latin typeface="Calibri"/>
+              </a:rPr>
+              <a:t>Stati von Experimenten </a:t>
+            </a:r>
+            <a:endParaRPr b="0" lang="de-DE" sz="2800" spc="-1" strike="noStrike">
+              <a:solidFill>
+                <a:srgbClr val="000000"/>
+              </a:solidFill>
+              <a:uFill>
+                <a:solidFill>
+                  <a:srgbClr val="ffffff"/>
+                </a:solidFill>
+              </a:uFill>
+              <a:latin typeface="Calibri"/>
+            </a:endParaRPr>
+          </a:p>
+          <a:p>
+            <a:pPr marL="228600" indent="-228240">
+              <a:lnSpc>
+                <a:spcPct val="90000"/>
+              </a:lnSpc>
+              <a:buClr>
+                <a:srgbClr val="000000"/>
+              </a:buClr>
+              <a:buFont typeface="Arial"/>
+              <a:buChar char="•"/>
+            </a:pPr>
+            <a:r>
+              <a:rPr b="0" lang="de-DE" sz="2800" spc="-1" strike="noStrike">
+                <a:solidFill>
+                  <a:srgbClr val="000000"/>
+                </a:solidFill>
+                <a:uFill>
+                  <a:solidFill>
+                    <a:srgbClr val="ffffff"/>
+                  </a:solidFill>
+                </a:uFill>
+                <a:latin typeface="Calibri"/>
+              </a:rPr>
+              <a:t>Experimentübersicht</a:t>
+            </a:r>
+            <a:endParaRPr b="0" lang="de-DE" sz="2800" spc="-1" strike="noStrike">
+              <a:solidFill>
+                <a:srgbClr val="000000"/>
+              </a:solidFill>
+              <a:uFill>
+                <a:solidFill>
+                  <a:srgbClr val="ffffff"/>
+                </a:solidFill>
+              </a:uFill>
+              <a:latin typeface="Calibri"/>
+            </a:endParaRPr>
+          </a:p>
+          <a:p>
+            <a:pPr marL="228600" indent="-228240">
+              <a:lnSpc>
+                <a:spcPct val="90000"/>
+              </a:lnSpc>
+              <a:buClr>
+                <a:srgbClr val="000000"/>
+              </a:buClr>
+              <a:buFont typeface="Arial"/>
+              <a:buChar char="•"/>
+            </a:pPr>
+            <a:r>
+              <a:rPr b="0" lang="de-DE" sz="2800" spc="-1" strike="noStrike">
+                <a:solidFill>
+                  <a:srgbClr val="000000"/>
+                </a:solidFill>
+                <a:uFill>
+                  <a:solidFill>
+                    <a:srgbClr val="ffffff"/>
+                  </a:solidFill>
+                </a:uFill>
+                <a:latin typeface="Calibri"/>
+              </a:rPr>
+              <a:t>Experiment-Ergebnis</a:t>
+            </a:r>
+            <a:endParaRPr b="0" lang="de-DE" sz="2800" spc="-1" strike="noStrike">
+              <a:solidFill>
+                <a:srgbClr val="000000"/>
+              </a:solidFill>
+              <a:uFill>
+                <a:solidFill>
+                  <a:srgbClr val="ffffff"/>
+                </a:solidFill>
+              </a:uFill>
+              <a:latin typeface="Calibri"/>
+            </a:endParaRPr>
+          </a:p>
+          <a:p>
+            <a:pPr marL="228600" indent="-228240">
+              <a:lnSpc>
+                <a:spcPct val="90000"/>
+              </a:lnSpc>
+              <a:buClr>
+                <a:srgbClr val="000000"/>
+              </a:buClr>
+              <a:buFont typeface="Arial"/>
+              <a:buChar char="•"/>
+            </a:pPr>
+            <a:r>
+              <a:rPr b="0" lang="de-DE" sz="2800" spc="-1" strike="noStrike">
+                <a:solidFill>
+                  <a:srgbClr val="000000"/>
+                </a:solidFill>
+                <a:uFill>
+                  <a:solidFill>
+                    <a:srgbClr val="ffffff"/>
+                  </a:solidFill>
+                </a:uFill>
+                <a:latin typeface="Calibri"/>
+              </a:rPr>
+              <a:t>Netzwerk</a:t>
+            </a:r>
+            <a:endParaRPr b="0" lang="de-DE" sz="2800" spc="-1" strike="noStrike">
+              <a:solidFill>
+                <a:srgbClr val="000000"/>
+              </a:solidFill>
+              <a:uFill>
+                <a:solidFill>
+                  <a:srgbClr val="ffffff"/>
+                </a:solidFill>
+              </a:uFill>
+              <a:latin typeface="Calibri"/>
+            </a:endParaRPr>
+          </a:p>
+          <a:p>
+            <a:pPr marL="228600" indent="-228240">
+              <a:lnSpc>
+                <a:spcPct val="90000"/>
+              </a:lnSpc>
+              <a:buClr>
+                <a:srgbClr val="000000"/>
+              </a:buClr>
+              <a:buFont typeface="Arial"/>
+              <a:buChar char="•"/>
+            </a:pPr>
+            <a:r>
+              <a:rPr b="0" lang="de-DE" sz="2800" spc="-1" strike="noStrike">
+                <a:solidFill>
+                  <a:srgbClr val="000000"/>
+                </a:solidFill>
+                <a:uFill>
+                  <a:solidFill>
+                    <a:srgbClr val="ffffff"/>
+                  </a:solidFill>
+                </a:uFill>
+                <a:latin typeface="Calibri"/>
+              </a:rPr>
+              <a:t>Ethische Leitlinien</a:t>
             </a:r>
             <a:endParaRPr b="0" lang="de-DE" sz="2800" spc="-1" strike="noStrike">
               <a:solidFill>
@@ -6011,9 +7899,9 @@
           <p:nvPr/>
         </p:nvSpPr>
         <p:spPr>
-          <a:xfrm rot="10800000">
-            <a:off x="838080" y="365040"/>
-            <a:ext cx="1095120" cy="603000"/>
+          <a:xfrm>
+            <a:off x="11353680" y="319320"/>
+            <a:ext cx="10515960" cy="1175760"/>
           </a:xfrm>
           <a:prstGeom prst="rect">
             <a:avLst/>
@@ -6026,6 +7914,25 @@
         <p:txBody>
           <a:bodyPr anchor="ctr"/>
           <a:p>
+            <a:pPr>
+              <a:lnSpc>
+                <a:spcPct val="90000"/>
+              </a:lnSpc>
+            </a:pPr>
+            <a:r>
+              <a:rPr b="0" lang="de-DE" sz="4400" spc="-1" strike="noStrike">
+                <a:solidFill>
+                  <a:srgbClr val="000000"/>
+                </a:solidFill>
+                <a:uFill>
+                  <a:solidFill>
+                    <a:srgbClr val="ffffff"/>
+                  </a:solidFill>
+                </a:uFill>
+                <a:latin typeface="Calibri Light"/>
+              </a:rPr>
+              <a:t>Main Properties</a:t>
+            </a:r>
             <a:endParaRPr b="0" lang="de-DE" sz="1800" spc="-1" strike="noStrike">
               <a:solidFill>
                 <a:srgbClr val="000000"/>
@@ -6048,8 +7955,8 @@
         </p:nvSpPr>
         <p:spPr>
           <a:xfrm>
-            <a:off x="838080" y="365040"/>
-            <a:ext cx="10515240" cy="5811480"/>
+            <a:off x="838080" y="1825560"/>
+            <a:ext cx="10515240" cy="4350960"/>
           </a:xfrm>
           <a:prstGeom prst="rect">
             <a:avLst/>
@@ -6061,52 +7968,6 @@
         </p:spPr>
         <p:txBody>
           <a:bodyPr/>
-          <a:p>
-            <a:pPr algn="ctr">
-              <a:lnSpc>
-                <a:spcPct val="100000"/>
-              </a:lnSpc>
-            </a:pPr>
-            <a:r>
-              <a:rPr b="1" lang="de-DE" sz="2800" spc="-1" strike="noStrike">
-                <a:solidFill>
-                  <a:srgbClr val="000000"/>
-                </a:solidFill>
-                <a:uFill>
-                  <a:solidFill>
-                    <a:srgbClr val="ffffff"/>
-                  </a:solidFill>
-                </a:uFill>
-                <a:latin typeface="Calibri"/>
-              </a:rPr>
-              <a:t>Functional</a:t>
-            </a:r>
-            <a:r>
-              <a:rPr b="0" lang="de-DE" sz="2800" spc="-1" strike="noStrike">
-                <a:solidFill>
-                  <a:srgbClr val="000000"/>
-                </a:solidFill>
-                <a:uFill>
-                  <a:solidFill>
-                    <a:srgbClr val="ffffff"/>
-                  </a:solidFill>
-                </a:uFill>
-                <a:latin typeface="Calibri"/>
-              </a:rPr>
-              <a:t> System Requirements</a:t>
-            </a:r>
-            <a:endParaRPr b="0" lang="de-DE" sz="2800" spc="-1" strike="noStrike">
-              <a:solidFill>
-                <a:srgbClr val="000000"/>
-              </a:solidFill>
-              <a:uFill>
-                <a:solidFill>
-                  <a:srgbClr val="ffffff"/>
-                </a:solidFill>
-              </a:uFill>
-              <a:latin typeface="Calibri"/>
-            </a:endParaRPr>
-          </a:p>
           <a:p>
             <a:pPr marL="228600" indent="-228240">
               <a:lnSpc>
@@ -6130,8 +7991,72 @@
                 </a:uFill>
                 <a:latin typeface="Calibri"/>
               </a:rPr>
-              <a:t>Technische Anforderungen </a:t>
-            </a:r>
+              <a:t>User Requirements</a:t>
+            </a:r>
+            <a:endParaRPr b="0" lang="de-DE" sz="2800" spc="-1" strike="noStrike">
+              <a:solidFill>
+                <a:srgbClr val="000000"/>
+              </a:solidFill>
+              <a:uFill>
+                <a:solidFill>
+                  <a:srgbClr val="ffffff"/>
+                </a:solidFill>
+              </a:uFill>
+              <a:latin typeface="Calibri"/>
+            </a:endParaRPr>
+          </a:p>
+          <a:p>
+            <a:pPr>
+              <a:lnSpc>
+                <a:spcPct val="100000"/>
+              </a:lnSpc>
+            </a:pPr>
+            <a:r>
+              <a:rPr b="0" lang="de-DE" sz="2800" spc="-1" strike="noStrike">
+                <a:solidFill>
+                  <a:srgbClr val="000000"/>
+                </a:solidFill>
+                <a:uFill>
+                  <a:solidFill>
+                    <a:srgbClr val="ffffff"/>
+                  </a:solidFill>
+                </a:uFill>
+                <a:latin typeface="Wingdings"/>
+              </a:rPr>
+              <a:t></a:t>
+            </a:r>
+            <a:r>
+              <a:rPr b="0" lang="de-DE" sz="2800" spc="-1" strike="noStrike">
+                <a:solidFill>
+                  <a:srgbClr val="000000"/>
+                </a:solidFill>
+                <a:uFill>
+                  <a:solidFill>
+                    <a:srgbClr val="ffffff"/>
+                  </a:solidFill>
+                </a:uFill>
+                <a:latin typeface="Calibri"/>
+              </a:rPr>
+              <a:t>Bedürfnisse/Wünsche vom Stakeholder  an die App gestellt werden</a:t>
+            </a:r>
+            <a:endParaRPr b="0" lang="de-DE" sz="2800" spc="-1" strike="noStrike">
+              <a:solidFill>
+                <a:srgbClr val="000000"/>
+              </a:solidFill>
+              <a:uFill>
+                <a:solidFill>
+                  <a:srgbClr val="ffffff"/>
+                </a:solidFill>
+              </a:uFill>
+              <a:latin typeface="Calibri"/>
+            </a:endParaRPr>
+          </a:p>
+          <a:p>
+            <a:pPr>
+              <a:lnSpc>
+                <a:spcPct val="100000"/>
+              </a:lnSpc>
+            </a:pPr>
             <a:endParaRPr b="0" lang="de-DE" sz="2800" spc="-1" strike="noStrike">
               <a:solidFill>
                 <a:srgbClr val="000000"/>
@@ -6167,340 +8092,53 @@
                 </a:uFill>
                 <a:latin typeface="Calibri"/>
               </a:rPr>
-              <a:t>Benutzer</a:t>
-            </a:r>
-            <a:endParaRPr b="0" lang="de-DE" sz="2800" spc="-1" strike="noStrike">
-              <a:solidFill>
-                <a:srgbClr val="000000"/>
-              </a:solidFill>
-              <a:uFill>
-                <a:solidFill>
-                  <a:srgbClr val="ffffff"/>
-                </a:solidFill>
-              </a:uFill>
-              <a:latin typeface="Calibri"/>
-            </a:endParaRPr>
-          </a:p>
-          <a:p>
-            <a:pPr marL="228600" indent="-228240">
+              <a:t>System Requirements</a:t>
+            </a:r>
+            <a:endParaRPr b="0" lang="de-DE" sz="2800" spc="-1" strike="noStrike">
+              <a:solidFill>
+                <a:srgbClr val="000000"/>
+              </a:solidFill>
+              <a:uFill>
+                <a:solidFill>
+                  <a:srgbClr val="ffffff"/>
+                </a:solidFill>
+              </a:uFill>
+              <a:latin typeface="Calibri"/>
+            </a:endParaRPr>
+          </a:p>
+          <a:p>
+            <a:pPr>
               <a:lnSpc>
-                <a:spcPct val="90000"/>
+                <a:spcPct val="100000"/>
               </a:lnSpc>
-              <a:buClr>
-                <a:srgbClr val="000000"/>
-              </a:buClr>
-              <a:buFont typeface="Arial"/>
-              <a:buChar char="•"/>
-            </a:pPr>
-            <a:r>
-              <a:rPr b="0" lang="de-DE" sz="2800" spc="-1" strike="noStrike">
-                <a:solidFill>
-                  <a:srgbClr val="000000"/>
-                </a:solidFill>
-                <a:uFill>
-                  <a:solidFill>
-                    <a:srgbClr val="ffffff"/>
-                  </a:solidFill>
-                </a:uFill>
-                <a:latin typeface="Calibri"/>
-              </a:rPr>
-              <a:t>System Administrator</a:t>
-            </a:r>
-            <a:endParaRPr b="0" lang="de-DE" sz="2800" spc="-1" strike="noStrike">
-              <a:solidFill>
-                <a:srgbClr val="000000"/>
-              </a:solidFill>
-              <a:uFill>
-                <a:solidFill>
-                  <a:srgbClr val="ffffff"/>
-                </a:solidFill>
-              </a:uFill>
-              <a:latin typeface="Calibri"/>
-            </a:endParaRPr>
-          </a:p>
-          <a:p>
-            <a:pPr marL="228600" indent="-228240">
-              <a:lnSpc>
-                <a:spcPct val="90000"/>
-              </a:lnSpc>
-              <a:buClr>
-                <a:srgbClr val="000000"/>
-              </a:buClr>
-              <a:buFont typeface="Arial"/>
-              <a:buChar char="•"/>
-            </a:pPr>
-            <a:r>
-              <a:rPr b="0" lang="de-DE" sz="2800" spc="-1" strike="noStrike">
-                <a:solidFill>
-                  <a:srgbClr val="000000"/>
-                </a:solidFill>
-                <a:uFill>
-                  <a:solidFill>
-                    <a:srgbClr val="ffffff"/>
-                  </a:solidFill>
-                </a:uFill>
-                <a:latin typeface="Calibri"/>
-              </a:rPr>
-              <a:t>Administrator</a:t>
-            </a:r>
-            <a:endParaRPr b="0" lang="de-DE" sz="2800" spc="-1" strike="noStrike">
-              <a:solidFill>
-                <a:srgbClr val="000000"/>
-              </a:solidFill>
-              <a:uFill>
-                <a:solidFill>
-                  <a:srgbClr val="ffffff"/>
-                </a:solidFill>
-              </a:uFill>
-              <a:latin typeface="Calibri"/>
-            </a:endParaRPr>
-          </a:p>
-          <a:p>
-            <a:pPr marL="228600" indent="-228240">
-              <a:lnSpc>
-                <a:spcPct val="90000"/>
-              </a:lnSpc>
-              <a:buClr>
-                <a:srgbClr val="000000"/>
-              </a:buClr>
-              <a:buFont typeface="Arial"/>
-              <a:buChar char="•"/>
-            </a:pPr>
-            <a:r>
-              <a:rPr b="0" lang="de-DE" sz="2800" spc="-1" strike="noStrike">
-                <a:solidFill>
-                  <a:srgbClr val="000000"/>
-                </a:solidFill>
-                <a:uFill>
-                  <a:solidFill>
-                    <a:srgbClr val="ffffff"/>
-                  </a:solidFill>
-                </a:uFill>
-                <a:latin typeface="Calibri"/>
-              </a:rPr>
-              <a:t>Clients</a:t>
-            </a:r>
-            <a:endParaRPr b="0" lang="de-DE" sz="2800" spc="-1" strike="noStrike">
-              <a:solidFill>
-                <a:srgbClr val="000000"/>
-              </a:solidFill>
-              <a:uFill>
-                <a:solidFill>
-                  <a:srgbClr val="ffffff"/>
-                </a:solidFill>
-              </a:uFill>
-              <a:latin typeface="Calibri"/>
-            </a:endParaRPr>
-          </a:p>
-          <a:p>
-            <a:pPr marL="228600" indent="-228240">
-              <a:lnSpc>
-                <a:spcPct val="90000"/>
-              </a:lnSpc>
-              <a:buClr>
-                <a:srgbClr val="000000"/>
-              </a:buClr>
-              <a:buFont typeface="Arial"/>
-              <a:buChar char="•"/>
-            </a:pPr>
-            <a:r>
-              <a:rPr b="0" lang="de-DE" sz="2800" spc="-1" strike="noStrike">
-                <a:solidFill>
-                  <a:srgbClr val="000000"/>
-                </a:solidFill>
-                <a:uFill>
-                  <a:solidFill>
-                    <a:srgbClr val="ffffff"/>
-                  </a:solidFill>
-                </a:uFill>
-                <a:latin typeface="Calibri"/>
-              </a:rPr>
-              <a:t>Experiment – Erstellung </a:t>
-            </a:r>
-            <a:endParaRPr b="0" lang="de-DE" sz="2800" spc="-1" strike="noStrike">
-              <a:solidFill>
-                <a:srgbClr val="000000"/>
-              </a:solidFill>
-              <a:uFill>
-                <a:solidFill>
-                  <a:srgbClr val="ffffff"/>
-                </a:solidFill>
-              </a:uFill>
-              <a:latin typeface="Calibri"/>
-            </a:endParaRPr>
-          </a:p>
-          <a:p>
-            <a:pPr marL="228600" indent="-228240">
-              <a:lnSpc>
-                <a:spcPct val="90000"/>
-              </a:lnSpc>
-              <a:buClr>
-                <a:srgbClr val="000000"/>
-              </a:buClr>
-              <a:buFont typeface="Arial"/>
-              <a:buChar char="•"/>
-            </a:pPr>
-            <a:r>
-              <a:rPr b="0" lang="de-DE" sz="2800" spc="-1" strike="noStrike">
-                <a:solidFill>
-                  <a:srgbClr val="000000"/>
-                </a:solidFill>
-                <a:uFill>
-                  <a:solidFill>
-                    <a:srgbClr val="ffffff"/>
-                  </a:solidFill>
-                </a:uFill>
-                <a:latin typeface="Calibri"/>
-              </a:rPr>
-              <a:t>Stati von Experimenten </a:t>
-            </a:r>
-            <a:endParaRPr b="0" lang="de-DE" sz="2800" spc="-1" strike="noStrike">
-              <a:solidFill>
-                <a:srgbClr val="000000"/>
-              </a:solidFill>
-              <a:uFill>
-                <a:solidFill>
-                  <a:srgbClr val="ffffff"/>
-                </a:solidFill>
-              </a:uFill>
-              <a:latin typeface="Calibri"/>
-            </a:endParaRPr>
-          </a:p>
-          <a:p>
-            <a:pPr marL="228600" indent="-228240">
-              <a:lnSpc>
-                <a:spcPct val="90000"/>
-              </a:lnSpc>
-              <a:buClr>
-                <a:srgbClr val="000000"/>
-              </a:buClr>
-              <a:buFont typeface="Arial"/>
-              <a:buChar char="•"/>
-            </a:pPr>
-            <a:r>
-              <a:rPr b="0" lang="de-DE" sz="2800" spc="-1" strike="noStrike">
-                <a:solidFill>
-                  <a:srgbClr val="000000"/>
-                </a:solidFill>
-                <a:uFill>
-                  <a:solidFill>
-                    <a:srgbClr val="ffffff"/>
-                  </a:solidFill>
-                </a:uFill>
-                <a:latin typeface="Calibri"/>
-              </a:rPr>
-              <a:t>Experimentübersicht</a:t>
-            </a:r>
-            <a:endParaRPr b="0" lang="de-DE" sz="2800" spc="-1" strike="noStrike">
-              <a:solidFill>
-                <a:srgbClr val="000000"/>
-              </a:solidFill>
-              <a:uFill>
-                <a:solidFill>
-                  <a:srgbClr val="ffffff"/>
-                </a:solidFill>
-              </a:uFill>
-              <a:latin typeface="Calibri"/>
-            </a:endParaRPr>
-          </a:p>
-          <a:p>
-            <a:pPr marL="228600" indent="-228240">
-              <a:lnSpc>
-                <a:spcPct val="90000"/>
-              </a:lnSpc>
-              <a:buClr>
-                <a:srgbClr val="000000"/>
-              </a:buClr>
-              <a:buFont typeface="Arial"/>
-              <a:buChar char="•"/>
-            </a:pPr>
-            <a:r>
-              <a:rPr b="0" lang="de-DE" sz="2800" spc="-1" strike="noStrike">
-                <a:solidFill>
-                  <a:srgbClr val="000000"/>
-                </a:solidFill>
-                <a:uFill>
-                  <a:solidFill>
-                    <a:srgbClr val="ffffff"/>
-                  </a:solidFill>
-                </a:uFill>
-                <a:latin typeface="Calibri"/>
-              </a:rPr>
-              <a:t>Experiment-Ergebnis</a:t>
-            </a:r>
-            <a:endParaRPr b="0" lang="de-DE" sz="2800" spc="-1" strike="noStrike">
-              <a:solidFill>
-                <a:srgbClr val="000000"/>
-              </a:solidFill>
-              <a:uFill>
-                <a:solidFill>
-                  <a:srgbClr val="ffffff"/>
-                </a:solidFill>
-              </a:uFill>
-              <a:latin typeface="Calibri"/>
-            </a:endParaRPr>
-          </a:p>
-          <a:p>
-            <a:pPr marL="228600" indent="-228240">
-              <a:lnSpc>
-                <a:spcPct val="90000"/>
-              </a:lnSpc>
-              <a:buClr>
-                <a:srgbClr val="000000"/>
-              </a:buClr>
-              <a:buFont typeface="Arial"/>
-              <a:buChar char="•"/>
-            </a:pPr>
-            <a:r>
-              <a:rPr b="0" lang="de-DE" sz="2800" spc="-1" strike="noStrike">
-                <a:solidFill>
-                  <a:srgbClr val="000000"/>
-                </a:solidFill>
-                <a:uFill>
-                  <a:solidFill>
-                    <a:srgbClr val="ffffff"/>
-                  </a:solidFill>
-                </a:uFill>
-                <a:latin typeface="Calibri"/>
-              </a:rPr>
-              <a:t>Netzwerk</a:t>
-            </a:r>
-            <a:endParaRPr b="0" lang="de-DE" sz="2800" spc="-1" strike="noStrike">
-              <a:solidFill>
-                <a:srgbClr val="000000"/>
-              </a:solidFill>
-              <a:uFill>
-                <a:solidFill>
-                  <a:srgbClr val="ffffff"/>
-                </a:solidFill>
-              </a:uFill>
-              <a:latin typeface="Calibri"/>
-            </a:endParaRPr>
-          </a:p>
-          <a:p>
-            <a:pPr marL="228600" indent="-228240">
-              <a:lnSpc>
-                <a:spcPct val="90000"/>
-              </a:lnSpc>
-              <a:buClr>
-                <a:srgbClr val="000000"/>
-              </a:buClr>
-              <a:buFont typeface="Arial"/>
-              <a:buChar char="•"/>
-            </a:pPr>
-            <a:r>
-              <a:rPr b="0" lang="de-DE" sz="2800" spc="-1" strike="noStrike">
-                <a:solidFill>
-                  <a:srgbClr val="000000"/>
-                </a:solidFill>
-                <a:uFill>
-                  <a:solidFill>
-                    <a:srgbClr val="ffffff"/>
-                  </a:solidFill>
-                </a:uFill>
-                <a:latin typeface="Calibri"/>
-              </a:rPr>
-              <a:t>Ethische Leitlinien</a:t>
+            </a:pPr>
+            <a:r>
+              <a:rPr b="0" lang="de-DE" sz="2800" spc="-1" strike="noStrike">
+                <a:solidFill>
+                  <a:srgbClr val="000000"/>
+                </a:solidFill>
+                <a:uFill>
+                  <a:solidFill>
+                    <a:srgbClr val="ffffff"/>
+                  </a:solidFill>
+                </a:uFill>
+                <a:latin typeface="Wingdings"/>
+              </a:rPr>
+              <a:t></a:t>
+            </a:r>
+            <a:r>
+              <a:rPr b="0" lang="de-DE" sz="2800" spc="-1" strike="noStrike">
+                <a:solidFill>
+                  <a:srgbClr val="000000"/>
+                </a:solidFill>
+                <a:uFill>
+                  <a:solidFill>
+                    <a:srgbClr val="ffffff"/>
+                  </a:solidFill>
+                </a:uFill>
+                <a:latin typeface="Calibri"/>
+              </a:rPr>
+              <a:t>Voraussetzungen an das System</a:t>
             </a:r>
             <a:endParaRPr b="0" lang="de-DE" sz="2800" spc="-1" strike="noStrike">
               <a:solidFill>
@@ -6573,8 +8211,8 @@
         </p:nvSpPr>
         <p:spPr>
           <a:xfrm>
-            <a:off x="11353680" y="319320"/>
-            <a:ext cx="10515960" cy="1175760"/>
+            <a:off x="838080" y="365040"/>
+            <a:ext cx="10515240" cy="1034640"/>
           </a:xfrm>
           <a:prstGeom prst="rect">
             <a:avLst/>
@@ -6604,7 +8242,7 @@
                 </a:uFill>
                 <a:latin typeface="Calibri Light"/>
               </a:rPr>
-              <a:t>Main Properties</a:t>
+              <a:t>Eigenschaften von Requirements</a:t>
             </a:r>
             <a:endParaRPr b="0" lang="de-DE" sz="1800" spc="-1" strike="noStrike">
               <a:solidFill>
@@ -6664,72 +8302,8 @@
                 </a:uFill>
                 <a:latin typeface="Calibri"/>
               </a:rPr>
-              <a:t>User Requirements</a:t>
-            </a:r>
-            <a:endParaRPr b="0" lang="de-DE" sz="2800" spc="-1" strike="noStrike">
-              <a:solidFill>
-                <a:srgbClr val="000000"/>
-              </a:solidFill>
-              <a:uFill>
-                <a:solidFill>
-                  <a:srgbClr val="ffffff"/>
-                </a:solidFill>
-              </a:uFill>
-              <a:latin typeface="Calibri"/>
-            </a:endParaRPr>
-          </a:p>
-          <a:p>
-            <a:pPr>
-              <a:lnSpc>
-                <a:spcPct val="100000"/>
-              </a:lnSpc>
-            </a:pPr>
-            <a:r>
-              <a:rPr b="0" lang="de-DE" sz="2800" spc="-1" strike="noStrike">
-                <a:solidFill>
-                  <a:srgbClr val="000000"/>
-                </a:solidFill>
-                <a:uFill>
-                  <a:solidFill>
-                    <a:srgbClr val="ffffff"/>
-                  </a:solidFill>
-                </a:uFill>
-                <a:latin typeface="Wingdings"/>
-              </a:rPr>
-              <a:t></a:t>
-            </a:r>
-            <a:r>
-              <a:rPr b="0" lang="de-DE" sz="2800" spc="-1" strike="noStrike">
-                <a:solidFill>
-                  <a:srgbClr val="000000"/>
-                </a:solidFill>
-                <a:uFill>
-                  <a:solidFill>
-                    <a:srgbClr val="ffffff"/>
-                  </a:solidFill>
-                </a:uFill>
-                <a:latin typeface="Calibri"/>
-              </a:rPr>
-              <a:t>Bedürfnisse/Wünsche vom Stakeholder  an die App gestellt werden</a:t>
-            </a:r>
-            <a:endParaRPr b="0" lang="de-DE" sz="2800" spc="-1" strike="noStrike">
-              <a:solidFill>
-                <a:srgbClr val="000000"/>
-              </a:solidFill>
-              <a:uFill>
-                <a:solidFill>
-                  <a:srgbClr val="ffffff"/>
-                </a:solidFill>
-              </a:uFill>
-              <a:latin typeface="Calibri"/>
-            </a:endParaRPr>
-          </a:p>
-          <a:p>
-            <a:pPr>
-              <a:lnSpc>
-                <a:spcPct val="100000"/>
-              </a:lnSpc>
-            </a:pPr>
+              <a:t>Sollen nur eine Sache betreffen</a:t>
+            </a:r>
             <a:endParaRPr b="0" lang="de-DE" sz="2800" spc="-1" strike="noStrike">
               <a:solidFill>
                 <a:srgbClr val="000000"/>
@@ -6765,7 +8339,155 @@
                 </a:uFill>
                 <a:latin typeface="Calibri"/>
               </a:rPr>
-              <a:t>System Requirements</a:t>
+              <a:t>Vollständig</a:t>
+            </a:r>
+            <a:endParaRPr b="0" lang="de-DE" sz="2800" spc="-1" strike="noStrike">
+              <a:solidFill>
+                <a:srgbClr val="000000"/>
+              </a:solidFill>
+              <a:uFill>
+                <a:solidFill>
+                  <a:srgbClr val="ffffff"/>
+                </a:solidFill>
+              </a:uFill>
+              <a:latin typeface="Calibri"/>
+            </a:endParaRPr>
+          </a:p>
+          <a:p>
+            <a:pPr marL="228600" indent="-228240">
+              <a:lnSpc>
+                <a:spcPct val="90000"/>
+              </a:lnSpc>
+              <a:buClr>
+                <a:srgbClr val="000000"/>
+              </a:buClr>
+              <a:buFont typeface="Arial"/>
+              <a:buChar char="•"/>
+            </a:pPr>
+            <a:r>
+              <a:rPr b="0" lang="de-DE" sz="2800" spc="-1" strike="noStrike">
+                <a:solidFill>
+                  <a:srgbClr val="000000"/>
+                </a:solidFill>
+                <a:uFill>
+                  <a:solidFill>
+                    <a:srgbClr val="ffffff"/>
+                  </a:solidFill>
+                </a:uFill>
+                <a:latin typeface="Calibri"/>
+              </a:rPr>
+              <a:t>Kein Wiederspruch zu anderen Requirements</a:t>
+            </a:r>
+            <a:endParaRPr b="0" lang="de-DE" sz="2800" spc="-1" strike="noStrike">
+              <a:solidFill>
+                <a:srgbClr val="000000"/>
+              </a:solidFill>
+              <a:uFill>
+                <a:solidFill>
+                  <a:srgbClr val="ffffff"/>
+                </a:solidFill>
+              </a:uFill>
+              <a:latin typeface="Calibri"/>
+            </a:endParaRPr>
+          </a:p>
+          <a:p>
+            <a:pPr marL="228600" indent="-228240">
+              <a:lnSpc>
+                <a:spcPct val="90000"/>
+              </a:lnSpc>
+              <a:buClr>
+                <a:srgbClr val="000000"/>
+              </a:buClr>
+              <a:buFont typeface="Arial"/>
+              <a:buChar char="•"/>
+            </a:pPr>
+            <a:r>
+              <a:rPr b="0" lang="de-DE" sz="2800" spc="-1" strike="noStrike">
+                <a:solidFill>
+                  <a:srgbClr val="000000"/>
+                </a:solidFill>
+                <a:uFill>
+                  <a:solidFill>
+                    <a:srgbClr val="ffffff"/>
+                  </a:solidFill>
+                </a:uFill>
+                <a:latin typeface="Calibri"/>
+              </a:rPr>
+              <a:t>Zeitgemäß</a:t>
+            </a:r>
+            <a:endParaRPr b="0" lang="de-DE" sz="2800" spc="-1" strike="noStrike">
+              <a:solidFill>
+                <a:srgbClr val="000000"/>
+              </a:solidFill>
+              <a:uFill>
+                <a:solidFill>
+                  <a:srgbClr val="ffffff"/>
+                </a:solidFill>
+              </a:uFill>
+              <a:latin typeface="Calibri"/>
+            </a:endParaRPr>
+          </a:p>
+          <a:p>
+            <a:pPr marL="228600" indent="-228240">
+              <a:lnSpc>
+                <a:spcPct val="90000"/>
+              </a:lnSpc>
+              <a:buClr>
+                <a:srgbClr val="000000"/>
+              </a:buClr>
+              <a:buFont typeface="Arial"/>
+              <a:buChar char="•"/>
+            </a:pPr>
+            <a:r>
+              <a:rPr b="0" lang="de-DE" sz="2800" spc="-1" strike="noStrike">
+                <a:solidFill>
+                  <a:srgbClr val="000000"/>
+                </a:solidFill>
+                <a:uFill>
+                  <a:solidFill>
+                    <a:srgbClr val="ffffff"/>
+                  </a:solidFill>
+                </a:uFill>
+                <a:latin typeface="Calibri"/>
+              </a:rPr>
+              <a:t>Einfach formuliert</a:t>
+            </a:r>
+            <a:endParaRPr b="0" lang="de-DE" sz="2800" spc="-1" strike="noStrike">
+              <a:solidFill>
+                <a:srgbClr val="000000"/>
+              </a:solidFill>
+              <a:uFill>
+                <a:solidFill>
+                  <a:srgbClr val="ffffff"/>
+                </a:solidFill>
+              </a:uFill>
+              <a:latin typeface="Calibri"/>
+            </a:endParaRPr>
+          </a:p>
+          <a:p>
+            <a:pPr marL="228600" indent="-228240">
+              <a:lnSpc>
+                <a:spcPct val="90000"/>
+              </a:lnSpc>
+              <a:buClr>
+                <a:srgbClr val="000000"/>
+              </a:buClr>
+              <a:buFont typeface="Arial"/>
+              <a:buChar char="•"/>
+            </a:pPr>
+            <a:r>
+              <a:rPr b="0" lang="de-DE" sz="2800" spc="-1" strike="noStrike">
+                <a:solidFill>
+                  <a:srgbClr val="000000"/>
+                </a:solidFill>
+                <a:uFill>
+                  <a:solidFill>
+                    <a:srgbClr val="ffffff"/>
+                  </a:solidFill>
+                </a:uFill>
+                <a:latin typeface="Calibri"/>
+              </a:rPr>
+              <a:t>Priorität</a:t>
             </a:r>
             <a:endParaRPr b="0" lang="de-DE" sz="2800" spc="-1" strike="noStrike">
               <a:solidFill>
@@ -6782,37 +8504,9 @@
           <a:p>
             <a:pPr>
               <a:lnSpc>
-                <a:spcPct val="100000"/>
+                <a:spcPct val="90000"/>
               </a:lnSpc>
             </a:pPr>
-            <a:r>
-              <a:rPr b="0" lang="de-DE" sz="2800" spc="-1" strike="noStrike">
-                <a:solidFill>
-                  <a:srgbClr val="000000"/>
-                </a:solidFill>
-                <a:uFill>
-                  <a:solidFill>
-                    <a:srgbClr val="ffffff"/>
-                  </a:solidFill>
-                </a:uFill>
-                <a:latin typeface="Wingdings"/>
-              </a:rPr>
-              <a:t></a:t>
-            </a:r>
-            <a:r>
-              <a:rPr b="0" lang="de-DE" sz="2800" spc="-1" strike="noStrike">
-                <a:solidFill>
-                  <a:srgbClr val="000000"/>
-                </a:solidFill>
-                <a:uFill>
-                  <a:solidFill>
-                    <a:srgbClr val="ffffff"/>
-                  </a:solidFill>
-                </a:uFill>
-                <a:latin typeface="Calibri"/>
-              </a:rPr>
-              <a:t>Voraussetzungen an das System</a:t>
-            </a:r>
             <a:endParaRPr b="0" lang="de-DE" sz="2800" spc="-1" strike="noStrike">
               <a:solidFill>
                 <a:srgbClr val="000000"/>
@@ -6885,7 +8579,7 @@
         <p:spPr>
           <a:xfrm>
             <a:off x="838080" y="365040"/>
-            <a:ext cx="10515240" cy="1034640"/>
+            <a:ext cx="10515240" cy="1325160"/>
           </a:xfrm>
           <a:prstGeom prst="rect">
             <a:avLst/>
@@ -6896,13 +8590,9 @@
           </a:ln>
         </p:spPr>
         <p:txBody>
-          <a:bodyPr anchor="ctr"/>
-          <a:p>
-            <a:pPr>
-              <a:lnSpc>
-                <a:spcPct val="90000"/>
-              </a:lnSpc>
-            </a:pPr>
+          <a:bodyPr lIns="0" rIns="0" tIns="0" bIns="0" anchor="ctr"/>
+          <a:p>
+            <a:pPr algn="ctr"/>
             <a:r>
               <a:rPr b="0" lang="de-DE" sz="4400" spc="-1" strike="noStrike">
                 <a:solidFill>
@@ -6913,287 +8603,47 @@
                     <a:srgbClr val="ffffff"/>
                   </a:solidFill>
                 </a:uFill>
-                <a:latin typeface="Calibri Light"/>
-              </a:rPr>
-              <a:t>Eigenschaften von Requirements</a:t>
-            </a:r>
-            <a:endParaRPr b="0" lang="de-DE" sz="1800" spc="-1" strike="noStrike">
-              <a:solidFill>
-                <a:srgbClr val="000000"/>
-              </a:solidFill>
-              <a:uFill>
-                <a:solidFill>
-                  <a:srgbClr val="ffffff"/>
-                </a:solidFill>
-              </a:uFill>
-              <a:latin typeface="Calibri"/>
-            </a:endParaRPr>
-          </a:p>
-        </p:txBody>
-      </p:sp>
-      <p:sp>
-        <p:nvSpPr>
-          <p:cNvPr id="92" name="TextShape 2"/>
-          <p:cNvSpPr txBox="1"/>
+                <a:latin typeface="Calibri"/>
+              </a:rPr>
+              <a:t>Szenario: Registrierung als Client</a:t>
+            </a:r>
+            <a:endParaRPr b="0" lang="de-DE" sz="4400" spc="-1" strike="noStrike">
+              <a:solidFill>
+                <a:srgbClr val="000000"/>
+              </a:solidFill>
+              <a:uFill>
+                <a:solidFill>
+                  <a:srgbClr val="ffffff"/>
+                </a:solidFill>
+              </a:uFill>
+              <a:latin typeface="Calibri"/>
+            </a:endParaRPr>
+          </a:p>
+        </p:txBody>
+      </p:sp>
+      <p:pic>
+        <p:nvPicPr>
+          <p:cNvPr id="92" name="" descr=""/>
+          <p:cNvPicPr/>
           <p:nvPr/>
-        </p:nvSpPr>
-        <p:spPr>
-          <a:xfrm>
-            <a:off x="838080" y="1825560"/>
-            <a:ext cx="10515240" cy="4350960"/>
-          </a:xfrm>
-          <a:prstGeom prst="rect">
-            <a:avLst/>
-          </a:prstGeom>
-          <a:noFill/>
+        </p:nvPicPr>
+        <p:blipFill>
+          <a:blip r:embed="rId1"/>
+          <a:stretch/>
+        </p:blipFill>
+        <p:spPr>
+          <a:xfrm>
+            <a:off x="3433320" y="1908000"/>
+            <a:ext cx="5206680" cy="4025520"/>
+          </a:xfrm>
+          <a:prstGeom prst="rect">
+            <a:avLst/>
+          </a:prstGeom>
           <a:ln>
             <a:noFill/>
           </a:ln>
         </p:spPr>
-        <p:txBody>
-          <a:bodyPr/>
-          <a:p>
-            <a:pPr marL="228600" indent="-228240">
-              <a:lnSpc>
-                <a:spcPct val="90000"/>
-              </a:lnSpc>
-              <a:buClr>
-                <a:srgbClr val="000000"/>
-              </a:buClr>
-              <a:buFont typeface="Arial"/>
-              <a:buChar char="•"/>
-            </a:pPr>
-            <a:r>
-              <a:rPr b="0" lang="de-DE" sz="2800" spc="-1" strike="noStrike">
-                <a:solidFill>
-                  <a:srgbClr val="000000"/>
-                </a:solidFill>
-                <a:uFill>
-                  <a:solidFill>
-                    <a:srgbClr val="ffffff"/>
-                  </a:solidFill>
-                </a:uFill>
-                <a:latin typeface="Calibri"/>
-              </a:rPr>
-              <a:t>Sollen nur eine Sache betreffen</a:t>
-            </a:r>
-            <a:endParaRPr b="0" lang="de-DE" sz="2800" spc="-1" strike="noStrike">
-              <a:solidFill>
-                <a:srgbClr val="000000"/>
-              </a:solidFill>
-              <a:uFill>
-                <a:solidFill>
-                  <a:srgbClr val="ffffff"/>
-                </a:solidFill>
-              </a:uFill>
-              <a:latin typeface="Calibri"/>
-            </a:endParaRPr>
-          </a:p>
-          <a:p>
-            <a:pPr marL="228600" indent="-228240">
-              <a:lnSpc>
-                <a:spcPct val="90000"/>
-              </a:lnSpc>
-              <a:buClr>
-                <a:srgbClr val="000000"/>
-              </a:buClr>
-              <a:buFont typeface="Arial"/>
-              <a:buChar char="•"/>
-            </a:pPr>
-            <a:r>
-              <a:rPr b="0" lang="de-DE" sz="2800" spc="-1" strike="noStrike">
-                <a:solidFill>
-                  <a:srgbClr val="000000"/>
-                </a:solidFill>
-                <a:uFill>
-                  <a:solidFill>
-                    <a:srgbClr val="ffffff"/>
-                  </a:solidFill>
-                </a:uFill>
-                <a:latin typeface="Calibri"/>
-              </a:rPr>
-              <a:t>Vollständig</a:t>
-            </a:r>
-            <a:endParaRPr b="0" lang="de-DE" sz="2800" spc="-1" strike="noStrike">
-              <a:solidFill>
-                <a:srgbClr val="000000"/>
-              </a:solidFill>
-              <a:uFill>
-                <a:solidFill>
-                  <a:srgbClr val="ffffff"/>
-                </a:solidFill>
-              </a:uFill>
-              <a:latin typeface="Calibri"/>
-            </a:endParaRPr>
-          </a:p>
-          <a:p>
-            <a:pPr marL="228600" indent="-228240">
-              <a:lnSpc>
-                <a:spcPct val="90000"/>
-              </a:lnSpc>
-              <a:buClr>
-                <a:srgbClr val="000000"/>
-              </a:buClr>
-              <a:buFont typeface="Arial"/>
-              <a:buChar char="•"/>
-            </a:pPr>
-            <a:r>
-              <a:rPr b="0" lang="de-DE" sz="2800" spc="-1" strike="noStrike">
-                <a:solidFill>
-                  <a:srgbClr val="000000"/>
-                </a:solidFill>
-                <a:uFill>
-                  <a:solidFill>
-                    <a:srgbClr val="ffffff"/>
-                  </a:solidFill>
-                </a:uFill>
-                <a:latin typeface="Calibri"/>
-              </a:rPr>
-              <a:t>Kein Wiederspruch zu anderen Requirements</a:t>
-            </a:r>
-            <a:endParaRPr b="0" lang="de-DE" sz="2800" spc="-1" strike="noStrike">
-              <a:solidFill>
-                <a:srgbClr val="000000"/>
-              </a:solidFill>
-              <a:uFill>
-                <a:solidFill>
-                  <a:srgbClr val="ffffff"/>
-                </a:solidFill>
-              </a:uFill>
-              <a:latin typeface="Calibri"/>
-            </a:endParaRPr>
-          </a:p>
-          <a:p>
-            <a:pPr marL="228600" indent="-228240">
-              <a:lnSpc>
-                <a:spcPct val="90000"/>
-              </a:lnSpc>
-              <a:buClr>
-                <a:srgbClr val="000000"/>
-              </a:buClr>
-              <a:buFont typeface="Arial"/>
-              <a:buChar char="•"/>
-            </a:pPr>
-            <a:r>
-              <a:rPr b="0" lang="de-DE" sz="2800" spc="-1" strike="noStrike">
-                <a:solidFill>
-                  <a:srgbClr val="000000"/>
-                </a:solidFill>
-                <a:uFill>
-                  <a:solidFill>
-                    <a:srgbClr val="ffffff"/>
-                  </a:solidFill>
-                </a:uFill>
-                <a:latin typeface="Calibri"/>
-              </a:rPr>
-              <a:t>Zeitgemäß</a:t>
-            </a:r>
-            <a:endParaRPr b="0" lang="de-DE" sz="2800" spc="-1" strike="noStrike">
-              <a:solidFill>
-                <a:srgbClr val="000000"/>
-              </a:solidFill>
-              <a:uFill>
-                <a:solidFill>
-                  <a:srgbClr val="ffffff"/>
-                </a:solidFill>
-              </a:uFill>
-              <a:latin typeface="Calibri"/>
-            </a:endParaRPr>
-          </a:p>
-          <a:p>
-            <a:pPr marL="228600" indent="-228240">
-              <a:lnSpc>
-                <a:spcPct val="90000"/>
-              </a:lnSpc>
-              <a:buClr>
-                <a:srgbClr val="000000"/>
-              </a:buClr>
-              <a:buFont typeface="Arial"/>
-              <a:buChar char="•"/>
-            </a:pPr>
-            <a:r>
-              <a:rPr b="0" lang="de-DE" sz="2800" spc="-1" strike="noStrike">
-                <a:solidFill>
-                  <a:srgbClr val="000000"/>
-                </a:solidFill>
-                <a:uFill>
-                  <a:solidFill>
-                    <a:srgbClr val="ffffff"/>
-                  </a:solidFill>
-                </a:uFill>
-                <a:latin typeface="Calibri"/>
-              </a:rPr>
-              <a:t>Einfach formuliert</a:t>
-            </a:r>
-            <a:endParaRPr b="0" lang="de-DE" sz="2800" spc="-1" strike="noStrike">
-              <a:solidFill>
-                <a:srgbClr val="000000"/>
-              </a:solidFill>
-              <a:uFill>
-                <a:solidFill>
-                  <a:srgbClr val="ffffff"/>
-                </a:solidFill>
-              </a:uFill>
-              <a:latin typeface="Calibri"/>
-            </a:endParaRPr>
-          </a:p>
-          <a:p>
-            <a:pPr marL="228600" indent="-228240">
-              <a:lnSpc>
-                <a:spcPct val="90000"/>
-              </a:lnSpc>
-              <a:buClr>
-                <a:srgbClr val="000000"/>
-              </a:buClr>
-              <a:buFont typeface="Arial"/>
-              <a:buChar char="•"/>
-            </a:pPr>
-            <a:r>
-              <a:rPr b="0" lang="de-DE" sz="2800" spc="-1" strike="noStrike">
-                <a:solidFill>
-                  <a:srgbClr val="000000"/>
-                </a:solidFill>
-                <a:uFill>
-                  <a:solidFill>
-                    <a:srgbClr val="ffffff"/>
-                  </a:solidFill>
-                </a:uFill>
-                <a:latin typeface="Calibri"/>
-              </a:rPr>
-              <a:t>Priorität</a:t>
-            </a:r>
-            <a:endParaRPr b="0" lang="de-DE" sz="2800" spc="-1" strike="noStrike">
-              <a:solidFill>
-                <a:srgbClr val="000000"/>
-              </a:solidFill>
-              <a:uFill>
-                <a:solidFill>
-                  <a:srgbClr val="ffffff"/>
-                </a:solidFill>
-              </a:uFill>
-              <a:latin typeface="Calibri"/>
-            </a:endParaRPr>
-          </a:p>
-          <a:p>
-            <a:pPr>
-              <a:lnSpc>
-                <a:spcPct val="90000"/>
-              </a:lnSpc>
-            </a:pPr>
-            <a:endParaRPr b="0" lang="de-DE" sz="2800" spc="-1" strike="noStrike">
-              <a:solidFill>
-                <a:srgbClr val="000000"/>
-              </a:solidFill>
-              <a:uFill>
-                <a:solidFill>
-                  <a:srgbClr val="ffffff"/>
-                </a:solidFill>
-              </a:uFill>
-              <a:latin typeface="Calibri"/>
-            </a:endParaRPr>
-          </a:p>
-        </p:txBody>
-      </p:sp>
+      </p:pic>
     </p:spTree>
   </p:cSld>
   <p:timing>
@@ -7266,29 +8716,267 @@
           <a:bodyPr lIns="0" rIns="0" tIns="0" bIns="0" anchor="ctr"/>
           <a:p>
             <a:r>
-              <a:rPr b="0" lang="de-DE" sz="1800" spc="-1" strike="noStrike">
-                <a:solidFill>
-                  <a:srgbClr val="000000"/>
-                </a:solidFill>
-                <a:uFill>
-                  <a:solidFill>
-                    <a:srgbClr val="ffffff"/>
-                  </a:solidFill>
-                </a:uFill>
-                <a:latin typeface="Calibri"/>
-              </a:rPr>
-              <a:t>Meine Testfolie</a:t>
-            </a:r>
-            <a:endParaRPr b="0" lang="de-DE" sz="1800" spc="-1" strike="noStrike">
-              <a:solidFill>
-                <a:srgbClr val="000000"/>
-              </a:solidFill>
-              <a:uFill>
-                <a:solidFill>
-                  <a:srgbClr val="ffffff"/>
-                </a:solidFill>
-              </a:uFill>
-              <a:latin typeface="Calibri"/>
+              <a:rPr b="0" lang="de-DE" sz="4400" spc="-1" strike="noStrike">
+                <a:solidFill>
+                  <a:srgbClr val="000000"/>
+                </a:solidFill>
+                <a:uFill>
+                  <a:solidFill>
+                    <a:srgbClr val="ffffff"/>
+                  </a:solidFill>
+                </a:uFill>
+                <a:latin typeface="Calibri"/>
+              </a:rPr>
+              <a:t>Registrierung – Was passieren sollte</a:t>
+            </a:r>
+            <a:endParaRPr b="0" lang="de-DE" sz="4400" spc="-1" strike="noStrike">
+              <a:solidFill>
+                <a:srgbClr val="000000"/>
+              </a:solidFill>
+              <a:uFill>
+                <a:solidFill>
+                  <a:srgbClr val="ffffff"/>
+                </a:solidFill>
+              </a:uFill>
+              <a:latin typeface="Calibri"/>
+            </a:endParaRPr>
+          </a:p>
+        </p:txBody>
+      </p:sp>
+      <p:sp>
+        <p:nvSpPr>
+          <p:cNvPr id="94" name="TextShape 2"/>
+          <p:cNvSpPr txBox="1"/>
+          <p:nvPr/>
+        </p:nvSpPr>
+        <p:spPr>
+          <a:xfrm>
+            <a:off x="838080" y="1656000"/>
+            <a:ext cx="5130000" cy="4392000"/>
+          </a:xfrm>
+          <a:prstGeom prst="rect">
+            <a:avLst/>
+          </a:prstGeom>
+          <a:noFill/>
+          <a:ln>
+            <a:noFill/>
+          </a:ln>
+        </p:spPr>
+        <p:txBody>
+          <a:bodyPr lIns="0" rIns="0" tIns="0" bIns="0" anchor="ctr"/>
+          <a:p>
+            <a:pPr marL="432000" indent="-324000">
+              <a:lnSpc>
+                <a:spcPct val="115000"/>
+              </a:lnSpc>
+              <a:buClr>
+                <a:srgbClr val="000000"/>
+              </a:buClr>
+              <a:buSzPct val="45000"/>
+              <a:buFont typeface="Wingdings" charset="2"/>
+              <a:buChar char=""/>
+            </a:pPr>
+            <a:r>
+              <a:rPr b="0" lang="de-DE" sz="2800" spc="-1" strike="noStrike">
+                <a:solidFill>
+                  <a:srgbClr val="000000"/>
+                </a:solidFill>
+                <a:uFill>
+                  <a:solidFill>
+                    <a:srgbClr val="ffffff"/>
+                  </a:solidFill>
+                </a:uFill>
+                <a:latin typeface="Calibri"/>
+              </a:rPr>
+              <a:t>Die Person installiert die App über den Google Play Store.</a:t>
+            </a:r>
+            <a:endParaRPr b="0" lang="de-DE" sz="2800" spc="-1" strike="noStrike">
+              <a:solidFill>
+                <a:srgbClr val="000000"/>
+              </a:solidFill>
+              <a:uFill>
+                <a:solidFill>
+                  <a:srgbClr val="ffffff"/>
+                </a:solidFill>
+              </a:uFill>
+              <a:latin typeface="Calibri"/>
+            </a:endParaRPr>
+          </a:p>
+          <a:p>
+            <a:pPr marL="432000" indent="-324000">
+              <a:lnSpc>
+                <a:spcPct val="115000"/>
+              </a:lnSpc>
+              <a:buClr>
+                <a:srgbClr val="000000"/>
+              </a:buClr>
+              <a:buSzPct val="45000"/>
+              <a:buFont typeface="Wingdings" charset="2"/>
+              <a:buChar char=""/>
+            </a:pPr>
+            <a:r>
+              <a:rPr b="0" lang="de-DE" sz="2800" spc="-1" strike="noStrike">
+                <a:solidFill>
+                  <a:srgbClr val="000000"/>
+                </a:solidFill>
+                <a:uFill>
+                  <a:solidFill>
+                    <a:srgbClr val="ffffff"/>
+                  </a:solidFill>
+                </a:uFill>
+                <a:latin typeface="Calibri"/>
+              </a:rPr>
+              <a:t>Sie startet die App, die sich mit dem Server verbindet und einen Registrierungsbildschirm anzeigt.</a:t>
+            </a:r>
+            <a:endParaRPr b="0" lang="de-DE" sz="2800" spc="-1" strike="noStrike">
+              <a:solidFill>
+                <a:srgbClr val="000000"/>
+              </a:solidFill>
+              <a:uFill>
+                <a:solidFill>
+                  <a:srgbClr val="ffffff"/>
+                </a:solidFill>
+              </a:uFill>
+              <a:latin typeface="Calibri"/>
+            </a:endParaRPr>
+          </a:p>
+          <a:p>
+            <a:pPr marL="432000" indent="-324000">
+              <a:lnSpc>
+                <a:spcPct val="115000"/>
+              </a:lnSpc>
+              <a:buClr>
+                <a:srgbClr val="000000"/>
+              </a:buClr>
+              <a:buSzPct val="45000"/>
+              <a:buFont typeface="Wingdings" charset="2"/>
+              <a:buChar char=""/>
+            </a:pPr>
+            <a:r>
+              <a:rPr b="0" lang="de-DE" sz="2800" spc="-1" strike="noStrike">
+                <a:solidFill>
+                  <a:srgbClr val="000000"/>
+                </a:solidFill>
+                <a:uFill>
+                  <a:solidFill>
+                    <a:srgbClr val="ffffff"/>
+                  </a:solidFill>
+                </a:uFill>
+                <a:latin typeface="Calibri"/>
+              </a:rPr>
+              <a:t> </a:t>
+            </a:r>
+            <a:endParaRPr b="0" lang="de-DE" sz="2800" spc="-1" strike="noStrike">
+              <a:solidFill>
+                <a:srgbClr val="000000"/>
+              </a:solidFill>
+              <a:uFill>
+                <a:solidFill>
+                  <a:srgbClr val="ffffff"/>
+                </a:solidFill>
+              </a:uFill>
+              <a:latin typeface="Calibri"/>
+            </a:endParaRPr>
+          </a:p>
+        </p:txBody>
+      </p:sp>
+      <p:sp>
+        <p:nvSpPr>
+          <p:cNvPr id="95" name="TextShape 3"/>
+          <p:cNvSpPr txBox="1"/>
+          <p:nvPr/>
+        </p:nvSpPr>
+        <p:spPr>
+          <a:xfrm>
+            <a:off x="6226200" y="1825560"/>
+            <a:ext cx="5131080" cy="4350960"/>
+          </a:xfrm>
+          <a:prstGeom prst="rect">
+            <a:avLst/>
+          </a:prstGeom>
+          <a:noFill/>
+          <a:ln>
+            <a:noFill/>
+          </a:ln>
+        </p:spPr>
+        <p:txBody>
+          <a:bodyPr lIns="0" rIns="0" tIns="0" bIns="0" anchor="ctr"/>
+          <a:p>
+            <a:pPr marL="432000" indent="-324000">
+              <a:lnSpc>
+                <a:spcPct val="115000"/>
+              </a:lnSpc>
+              <a:buClr>
+                <a:srgbClr val="000000"/>
+              </a:buClr>
+              <a:buSzPct val="45000"/>
+              <a:buFont typeface="Wingdings" charset="2"/>
+              <a:buChar char=""/>
+            </a:pPr>
+            <a:r>
+              <a:rPr b="0" lang="de-DE" sz="2800" spc="-1" strike="noStrike">
+                <a:solidFill>
+                  <a:srgbClr val="000000"/>
+                </a:solidFill>
+                <a:uFill>
+                  <a:solidFill>
+                    <a:srgbClr val="ffffff"/>
+                  </a:solidFill>
+                </a:uFill>
+                <a:latin typeface="Calibri"/>
+              </a:rPr>
+              <a:t>Sie wird aufgefordert die für die Registrierung erforderlichen Daten einzugeben. Sie gibt diese ein und bestätigt die Übermittlung an den Server.</a:t>
+            </a:r>
+            <a:endParaRPr b="0" lang="de-DE" sz="2800" spc="-1" strike="noStrike">
+              <a:solidFill>
+                <a:srgbClr val="000000"/>
+              </a:solidFill>
+              <a:uFill>
+                <a:solidFill>
+                  <a:srgbClr val="ffffff"/>
+                </a:solidFill>
+              </a:uFill>
+              <a:latin typeface="Calibri"/>
+              <a:ea typeface="Noto Sans CJK SC Regular"/>
+            </a:endParaRPr>
+          </a:p>
+          <a:p>
+            <a:pPr marL="432000" indent="-324000">
+              <a:lnSpc>
+                <a:spcPct val="115000"/>
+              </a:lnSpc>
+              <a:buClr>
+                <a:srgbClr val="000000"/>
+              </a:buClr>
+              <a:buSzPct val="45000"/>
+              <a:buFont typeface="Wingdings" charset="2"/>
+              <a:buChar char=""/>
+            </a:pPr>
+            <a:r>
+              <a:rPr b="0" lang="de-DE" sz="2800" spc="-1" strike="noStrike">
+                <a:solidFill>
+                  <a:srgbClr val="000000"/>
+                </a:solidFill>
+                <a:uFill>
+                  <a:solidFill>
+                    <a:srgbClr val="ffffff"/>
+                  </a:solidFill>
+                </a:uFill>
+                <a:latin typeface="Calibri"/>
+              </a:rPr>
+              <a:t>Der Server speichert die Eingaben in der Datenbank und meldet die erfolgreiche Registrierung zurück.</a:t>
+            </a:r>
+            <a:endParaRPr b="0" lang="de-DE" sz="2800" spc="-1" strike="noStrike">
+              <a:solidFill>
+                <a:srgbClr val="000000"/>
+              </a:solidFill>
+              <a:uFill>
+                <a:solidFill>
+                  <a:srgbClr val="ffffff"/>
+                </a:solidFill>
+              </a:uFill>
+              <a:latin typeface="Calibri"/>
+              <a:ea typeface="Noto Sans CJK SC Regular"/>
             </a:endParaRPr>
           </a:p>
         </p:txBody>

</xml_diff>